<commit_message>
resolved the repeating slide issue and worked on formatting
</commit_message>
<xml_diff>
--- a/powerpoint.pptx
+++ b/powerpoint.pptx
@@ -2,12 +2,15 @@
 <file path=ppt/presentation.xml><?xml version="1.0" encoding="utf-8"?>
 <p:presentation xmlns:a="http://schemas.openxmlformats.org/drawingml/2006/main" xmlns:r="http://schemas.openxmlformats.org/officeDocument/2006/relationships" xmlns:p="http://schemas.openxmlformats.org/presentationml/2006/main" saveSubsetFonts="1">
   <p:sldMasterIdLst>
-    <p:sldMasterId id="2147483660" r:id="rId4"/>
+    <p:sldMasterId id="2147483660" r:id="rId1"/>
   </p:sldMasterIdLst>
   <p:sldIdLst>
-    <p:sldId id="257" r:id="rId5"/>
-    <p:sldId id="256" r:id="rId6"/>
-    <p:sldId id="258" r:id="rId7"/>
+    <p:sldId id="256" r:id="rId2"/>
+    <p:sldId id="257" r:id="rId3"/>
+    <p:sldId id="258" r:id="rId4"/>
+    <p:sldId id="259" r:id="rId5"/>
+    <p:sldId id="260" r:id="rId6"/>
+    <p:sldId id="261" r:id="rId7"/>
   </p:sldIdLst>
   <p:sldSz cx="12192000" cy="6858000"/>
   <p:notesSz cx="6858000" cy="9144000"/>
@@ -106,18 +109,13 @@
       </a:defRPr>
     </a:lvl9pPr>
   </p:defaultTextStyle>
-  <p:extLst>
-    <p:ext uri="{EFAFB233-063F-42B5-8137-9DF3F51BA10A}">
-      <p15:sldGuideLst xmlns:p15="http://schemas.microsoft.com/office/powerpoint/2012/main"/>
-    </p:ext>
-  </p:extLst>
 </p:presentation>
 </file>
 
 <file path=ppt/revisionInfo.xml><?xml version="1.0" encoding="utf-8"?>
 <p1510:revInfo xmlns:a="http://schemas.openxmlformats.org/drawingml/2006/main" xmlns:r="http://schemas.openxmlformats.org/officeDocument/2006/relationships" xmlns:p1510="http://schemas.microsoft.com/office/powerpoint/2015/10/main">
   <p1510:revLst>
-    <p1510:client id="{ACF0E746-F6F1-328A-3A1F-1D69FD81E48B}" v="24" dt="2024-09-29T04:58:11.358"/>
+    <p1510:client id="{45152F7D-D0CD-4896-8216-CF693B4E6BDD}" v="6" dt="2024-10-16T00:03:14.525"/>
   </p1510:revLst>
 </p1510:revInfo>
 </file>
@@ -125,54 +123,99 @@
 <file path=ppt/changesInfos/changesInfo1.xml><?xml version="1.0" encoding="utf-8"?>
 <pc:chgInfo xmlns:a="http://schemas.openxmlformats.org/drawingml/2006/main" xmlns:r="http://schemas.openxmlformats.org/officeDocument/2006/relationships" xmlns:ac="http://schemas.microsoft.com/office/drawing/2013/main/command" xmlns:pc="http://schemas.microsoft.com/office/powerpoint/2013/main/command">
   <pc:docChgLst>
-    <pc:chgData name="Anna Ignatenkov" userId="S::aignatenkov@tulsafsbc.org::794aa5f8-af34-4d66-af3d-9c6e9c27b802" providerId="AD" clId="Web-{ACF0E746-F6F1-328A-3A1F-1D69FD81E48B}"/>
-    <pc:docChg chg="modSld">
-      <pc:chgData name="Anna Ignatenkov" userId="S::aignatenkov@tulsafsbc.org::794aa5f8-af34-4d66-af3d-9c6e9c27b802" providerId="AD" clId="Web-{ACF0E746-F6F1-328A-3A1F-1D69FD81E48B}" dt="2024-09-29T04:58:11.358" v="20" actId="20577"/>
+    <pc:chgData name="Mark Litvinov" userId="d5f8790f-236b-448e-bffb-d2fa8ceb5943" providerId="ADAL" clId="{45152F7D-D0CD-4896-8216-CF693B4E6BDD}"/>
+    <pc:docChg chg="custSel addSld modSld">
+      <pc:chgData name="Mark Litvinov" userId="d5f8790f-236b-448e-bffb-d2fa8ceb5943" providerId="ADAL" clId="{45152F7D-D0CD-4896-8216-CF693B4E6BDD}" dt="2024-10-16T00:03:16.928" v="590" actId="20577"/>
       <pc:docMkLst>
         <pc:docMk/>
       </pc:docMkLst>
-      <pc:sldChg chg="modSp">
-        <pc:chgData name="Anna Ignatenkov" userId="S::aignatenkov@tulsafsbc.org::794aa5f8-af34-4d66-af3d-9c6e9c27b802" providerId="AD" clId="Web-{ACF0E746-F6F1-328A-3A1F-1D69FD81E48B}" dt="2024-09-29T04:58:01.373" v="19" actId="20577"/>
+      <pc:sldChg chg="delSp modSp new mod">
+        <pc:chgData name="Mark Litvinov" userId="d5f8790f-236b-448e-bffb-d2fa8ceb5943" providerId="ADAL" clId="{45152F7D-D0CD-4896-8216-CF693B4E6BDD}" dt="2024-10-16T00:01:15.858" v="151" actId="20577"/>
         <pc:sldMkLst>
           <pc:docMk/>
-          <pc:sldMk cId="1741310931" sldId="256"/>
+          <pc:sldMk cId="1889788063" sldId="256"/>
         </pc:sldMkLst>
         <pc:spChg chg="mod">
-          <ac:chgData name="Anna Ignatenkov" userId="S::aignatenkov@tulsafsbc.org::794aa5f8-af34-4d66-af3d-9c6e9c27b802" providerId="AD" clId="Web-{ACF0E746-F6F1-328A-3A1F-1D69FD81E48B}" dt="2024-09-29T04:58:01.373" v="19" actId="20577"/>
+          <ac:chgData name="Mark Litvinov" userId="d5f8790f-236b-448e-bffb-d2fa8ceb5943" providerId="ADAL" clId="{45152F7D-D0CD-4896-8216-CF693B4E6BDD}" dt="2024-10-16T00:01:15.858" v="151" actId="20577"/>
           <ac:spMkLst>
             <pc:docMk/>
-            <pc:sldMk cId="1741310931" sldId="256"/>
-            <ac:spMk id="3" creationId="{72DF2D19-D144-D52E-6A2C-B42F3297DCF3}"/>
+            <pc:sldMk cId="1889788063" sldId="256"/>
+            <ac:spMk id="2" creationId="{BFDA464E-37E7-7D61-6E99-ACD35979E289}"/>
+          </ac:spMkLst>
+        </pc:spChg>
+        <pc:spChg chg="del mod">
+          <ac:chgData name="Mark Litvinov" userId="d5f8790f-236b-448e-bffb-d2fa8ceb5943" providerId="ADAL" clId="{45152F7D-D0CD-4896-8216-CF693B4E6BDD}" dt="2024-10-16T00:00:10.400" v="2" actId="478"/>
+          <ac:spMkLst>
+            <pc:docMk/>
+            <pc:sldMk cId="1889788063" sldId="256"/>
+            <ac:spMk id="3" creationId="{13472508-720D-710B-BE1D-87F574133529}"/>
           </ac:spMkLst>
         </pc:spChg>
       </pc:sldChg>
-      <pc:sldChg chg="modSp">
-        <pc:chgData name="Anna Ignatenkov" userId="S::aignatenkov@tulsafsbc.org::794aa5f8-af34-4d66-af3d-9c6e9c27b802" providerId="AD" clId="Web-{ACF0E746-F6F1-328A-3A1F-1D69FD81E48B}" dt="2024-09-29T04:58:11.358" v="20" actId="20577"/>
+      <pc:sldChg chg="modSp add mod">
+        <pc:chgData name="Mark Litvinov" userId="d5f8790f-236b-448e-bffb-d2fa8ceb5943" providerId="ADAL" clId="{45152F7D-D0CD-4896-8216-CF693B4E6BDD}" dt="2024-10-16T00:01:55.533" v="299" actId="20577"/>
         <pc:sldMkLst>
           <pc:docMk/>
-          <pc:sldMk cId="1794953803" sldId="257"/>
+          <pc:sldMk cId="3350942817" sldId="257"/>
         </pc:sldMkLst>
         <pc:spChg chg="mod">
-          <ac:chgData name="Anna Ignatenkov" userId="S::aignatenkov@tulsafsbc.org::794aa5f8-af34-4d66-af3d-9c6e9c27b802" providerId="AD" clId="Web-{ACF0E746-F6F1-328A-3A1F-1D69FD81E48B}" dt="2024-09-29T04:58:11.358" v="20" actId="20577"/>
+          <ac:chgData name="Mark Litvinov" userId="d5f8790f-236b-448e-bffb-d2fa8ceb5943" providerId="ADAL" clId="{45152F7D-D0CD-4896-8216-CF693B4E6BDD}" dt="2024-10-16T00:01:55.533" v="299" actId="20577"/>
           <ac:spMkLst>
             <pc:docMk/>
-            <pc:sldMk cId="1794953803" sldId="257"/>
-            <ac:spMk id="3" creationId="{E393FEF4-64A2-3209-71C7-85DC3AAB6E7F}"/>
+            <pc:sldMk cId="3350942817" sldId="257"/>
+            <ac:spMk id="2" creationId="{BFDA464E-37E7-7D61-6E99-ACD35979E289}"/>
           </ac:spMkLst>
         </pc:spChg>
       </pc:sldChg>
-      <pc:sldChg chg="modSp">
-        <pc:chgData name="Anna Ignatenkov" userId="S::aignatenkov@tulsafsbc.org::794aa5f8-af34-4d66-af3d-9c6e9c27b802" providerId="AD" clId="Web-{ACF0E746-F6F1-328A-3A1F-1D69FD81E48B}" dt="2024-09-29T04:57:27.544" v="15" actId="20577"/>
+      <pc:sldChg chg="modSp add mod">
+        <pc:chgData name="Mark Litvinov" userId="d5f8790f-236b-448e-bffb-d2fa8ceb5943" providerId="ADAL" clId="{45152F7D-D0CD-4896-8216-CF693B4E6BDD}" dt="2024-10-16T00:02:33.658" v="447" actId="20577"/>
         <pc:sldMkLst>
           <pc:docMk/>
-          <pc:sldMk cId="1666178883" sldId="258"/>
+          <pc:sldMk cId="292070290" sldId="258"/>
         </pc:sldMkLst>
         <pc:spChg chg="mod">
-          <ac:chgData name="Anna Ignatenkov" userId="S::aignatenkov@tulsafsbc.org::794aa5f8-af34-4d66-af3d-9c6e9c27b802" providerId="AD" clId="Web-{ACF0E746-F6F1-328A-3A1F-1D69FD81E48B}" dt="2024-09-29T04:57:27.544" v="15" actId="20577"/>
+          <ac:chgData name="Mark Litvinov" userId="d5f8790f-236b-448e-bffb-d2fa8ceb5943" providerId="ADAL" clId="{45152F7D-D0CD-4896-8216-CF693B4E6BDD}" dt="2024-10-16T00:02:33.658" v="447" actId="20577"/>
           <ac:spMkLst>
             <pc:docMk/>
-            <pc:sldMk cId="1666178883" sldId="258"/>
-            <ac:spMk id="3" creationId="{55CD1044-1DE7-DF1E-8B2E-9ABD534A280F}"/>
+            <pc:sldMk cId="292070290" sldId="258"/>
+            <ac:spMk id="2" creationId="{BFDA464E-37E7-7D61-6E99-ACD35979E289}"/>
+          </ac:spMkLst>
+        </pc:spChg>
+      </pc:sldChg>
+      <pc:sldChg chg="add">
+        <pc:chgData name="Mark Litvinov" userId="d5f8790f-236b-448e-bffb-d2fa8ceb5943" providerId="ADAL" clId="{45152F7D-D0CD-4896-8216-CF693B4E6BDD}" dt="2024-10-16T00:02:35.892" v="448"/>
+        <pc:sldMkLst>
+          <pc:docMk/>
+          <pc:sldMk cId="3863399069" sldId="259"/>
+        </pc:sldMkLst>
+      </pc:sldChg>
+      <pc:sldChg chg="modSp add mod">
+        <pc:chgData name="Mark Litvinov" userId="d5f8790f-236b-448e-bffb-d2fa8ceb5943" providerId="ADAL" clId="{45152F7D-D0CD-4896-8216-CF693B4E6BDD}" dt="2024-10-16T00:03:11.236" v="584" actId="20577"/>
+        <pc:sldMkLst>
+          <pc:docMk/>
+          <pc:sldMk cId="3084808657" sldId="260"/>
+        </pc:sldMkLst>
+        <pc:spChg chg="mod">
+          <ac:chgData name="Mark Litvinov" userId="d5f8790f-236b-448e-bffb-d2fa8ceb5943" providerId="ADAL" clId="{45152F7D-D0CD-4896-8216-CF693B4E6BDD}" dt="2024-10-16T00:03:11.236" v="584" actId="20577"/>
+          <ac:spMkLst>
+            <pc:docMk/>
+            <pc:sldMk cId="3084808657" sldId="260"/>
+            <ac:spMk id="2" creationId="{BFDA464E-37E7-7D61-6E99-ACD35979E289}"/>
+          </ac:spMkLst>
+        </pc:spChg>
+      </pc:sldChg>
+      <pc:sldChg chg="modSp add mod">
+        <pc:chgData name="Mark Litvinov" userId="d5f8790f-236b-448e-bffb-d2fa8ceb5943" providerId="ADAL" clId="{45152F7D-D0CD-4896-8216-CF693B4E6BDD}" dt="2024-10-16T00:03:16.928" v="590" actId="20577"/>
+        <pc:sldMkLst>
+          <pc:docMk/>
+          <pc:sldMk cId="9391457" sldId="261"/>
+        </pc:sldMkLst>
+        <pc:spChg chg="mod">
+          <ac:chgData name="Mark Litvinov" userId="d5f8790f-236b-448e-bffb-d2fa8ceb5943" providerId="ADAL" clId="{45152F7D-D0CD-4896-8216-CF693B4E6BDD}" dt="2024-10-16T00:03:16.928" v="590" actId="20577"/>
+          <ac:spMkLst>
+            <pc:docMk/>
+            <pc:sldMk cId="9391457" sldId="261"/>
+            <ac:spMk id="2" creationId="{BFDA464E-37E7-7D61-6E99-ACD35979E289}"/>
           </ac:spMkLst>
         </pc:spChg>
       </pc:sldChg>
@@ -310,9 +353,9 @@
           <a:bodyPr/>
           <a:lstStyle/>
           <a:p>
-            <a:fld id="{2F49F8D7-1DC4-4BDB-B6FA-14C4DF2E1043}" type="datetimeFigureOut">
+            <a:fld id="{72DA9259-FA67-4F94-A1FA-19D3606B534F}" type="datetimeFigureOut">
               <a:rPr lang="en-US" smtClean="0"/>
-              <a:t>9/28/2024</a:t>
+              <a:t>10/15/2024</a:t>
             </a:fld>
             <a:endParaRPr lang="en-US"/>
           </a:p>
@@ -352,7 +395,7 @@
           <a:bodyPr/>
           <a:lstStyle/>
           <a:p>
-            <a:fld id="{5D661ADA-AE8F-47E4-AB17-3C732F73DAF2}" type="slidenum">
+            <a:fld id="{5B43E8E4-2917-43F7-B6E9-46BEDD52166E}" type="slidenum">
               <a:rPr lang="en-US" smtClean="0"/>
               <a:t>‹#›</a:t>
             </a:fld>
@@ -363,7 +406,7 @@
     </p:spTree>
     <p:extLst>
       <p:ext uri="{BB962C8B-B14F-4D97-AF65-F5344CB8AC3E}">
-        <p14:creationId xmlns:p14="http://schemas.microsoft.com/office/powerpoint/2010/main" val="3413093616"/>
+        <p14:creationId xmlns:p14="http://schemas.microsoft.com/office/powerpoint/2010/main" val="1764466146"/>
       </p:ext>
     </p:extLst>
   </p:cSld>
@@ -480,9 +523,9 @@
           <a:bodyPr/>
           <a:lstStyle/>
           <a:p>
-            <a:fld id="{2F49F8D7-1DC4-4BDB-B6FA-14C4DF2E1043}" type="datetimeFigureOut">
+            <a:fld id="{72DA9259-FA67-4F94-A1FA-19D3606B534F}" type="datetimeFigureOut">
               <a:rPr lang="en-US" smtClean="0"/>
-              <a:t>9/28/2024</a:t>
+              <a:t>10/15/2024</a:t>
             </a:fld>
             <a:endParaRPr lang="en-US"/>
           </a:p>
@@ -522,7 +565,7 @@
           <a:bodyPr/>
           <a:lstStyle/>
           <a:p>
-            <a:fld id="{5D661ADA-AE8F-47E4-AB17-3C732F73DAF2}" type="slidenum">
+            <a:fld id="{5B43E8E4-2917-43F7-B6E9-46BEDD52166E}" type="slidenum">
               <a:rPr lang="en-US" smtClean="0"/>
               <a:t>‹#›</a:t>
             </a:fld>
@@ -533,7 +576,7 @@
     </p:spTree>
     <p:extLst>
       <p:ext uri="{BB962C8B-B14F-4D97-AF65-F5344CB8AC3E}">
-        <p14:creationId xmlns:p14="http://schemas.microsoft.com/office/powerpoint/2010/main" val="2085318717"/>
+        <p14:creationId xmlns:p14="http://schemas.microsoft.com/office/powerpoint/2010/main" val="4133469253"/>
       </p:ext>
     </p:extLst>
   </p:cSld>
@@ -660,9 +703,9 @@
           <a:bodyPr/>
           <a:lstStyle/>
           <a:p>
-            <a:fld id="{2F49F8D7-1DC4-4BDB-B6FA-14C4DF2E1043}" type="datetimeFigureOut">
+            <a:fld id="{72DA9259-FA67-4F94-A1FA-19D3606B534F}" type="datetimeFigureOut">
               <a:rPr lang="en-US" smtClean="0"/>
-              <a:t>9/28/2024</a:t>
+              <a:t>10/15/2024</a:t>
             </a:fld>
             <a:endParaRPr lang="en-US"/>
           </a:p>
@@ -702,7 +745,7 @@
           <a:bodyPr/>
           <a:lstStyle/>
           <a:p>
-            <a:fld id="{5D661ADA-AE8F-47E4-AB17-3C732F73DAF2}" type="slidenum">
+            <a:fld id="{5B43E8E4-2917-43F7-B6E9-46BEDD52166E}" type="slidenum">
               <a:rPr lang="en-US" smtClean="0"/>
               <a:t>‹#›</a:t>
             </a:fld>
@@ -713,7 +756,7 @@
     </p:spTree>
     <p:extLst>
       <p:ext uri="{BB962C8B-B14F-4D97-AF65-F5344CB8AC3E}">
-        <p14:creationId xmlns:p14="http://schemas.microsoft.com/office/powerpoint/2010/main" val="2474382798"/>
+        <p14:creationId xmlns:p14="http://schemas.microsoft.com/office/powerpoint/2010/main" val="4047496680"/>
       </p:ext>
     </p:extLst>
   </p:cSld>
@@ -830,9 +873,9 @@
           <a:bodyPr/>
           <a:lstStyle/>
           <a:p>
-            <a:fld id="{2F49F8D7-1DC4-4BDB-B6FA-14C4DF2E1043}" type="datetimeFigureOut">
+            <a:fld id="{72DA9259-FA67-4F94-A1FA-19D3606B534F}" type="datetimeFigureOut">
               <a:rPr lang="en-US" smtClean="0"/>
-              <a:t>9/28/2024</a:t>
+              <a:t>10/15/2024</a:t>
             </a:fld>
             <a:endParaRPr lang="en-US"/>
           </a:p>
@@ -872,7 +915,7 @@
           <a:bodyPr/>
           <a:lstStyle/>
           <a:p>
-            <a:fld id="{5D661ADA-AE8F-47E4-AB17-3C732F73DAF2}" type="slidenum">
+            <a:fld id="{5B43E8E4-2917-43F7-B6E9-46BEDD52166E}" type="slidenum">
               <a:rPr lang="en-US" smtClean="0"/>
               <a:t>‹#›</a:t>
             </a:fld>
@@ -883,7 +926,7 @@
     </p:spTree>
     <p:extLst>
       <p:ext uri="{BB962C8B-B14F-4D97-AF65-F5344CB8AC3E}">
-        <p14:creationId xmlns:p14="http://schemas.microsoft.com/office/powerpoint/2010/main" val="909882780"/>
+        <p14:creationId xmlns:p14="http://schemas.microsoft.com/office/powerpoint/2010/main" val="952882575"/>
       </p:ext>
     </p:extLst>
   </p:cSld>
@@ -966,7 +1009,7 @@
               <a:defRPr sz="2400">
                 <a:solidFill>
                   <a:schemeClr val="tx1">
-                    <a:tint val="75000"/>
+                    <a:shade val="82000"/>
                   </a:schemeClr>
                 </a:solidFill>
               </a:defRPr>
@@ -976,7 +1019,7 @@
               <a:defRPr sz="2000">
                 <a:solidFill>
                   <a:schemeClr val="tx1">
-                    <a:tint val="75000"/>
+                    <a:shade val="82000"/>
                   </a:schemeClr>
                 </a:solidFill>
               </a:defRPr>
@@ -986,7 +1029,7 @@
               <a:defRPr sz="1800">
                 <a:solidFill>
                   <a:schemeClr val="tx1">
-                    <a:tint val="75000"/>
+                    <a:shade val="82000"/>
                   </a:schemeClr>
                 </a:solidFill>
               </a:defRPr>
@@ -996,7 +1039,7 @@
               <a:defRPr sz="1600">
                 <a:solidFill>
                   <a:schemeClr val="tx1">
-                    <a:tint val="75000"/>
+                    <a:shade val="82000"/>
                   </a:schemeClr>
                 </a:solidFill>
               </a:defRPr>
@@ -1006,7 +1049,7 @@
               <a:defRPr sz="1600">
                 <a:solidFill>
                   <a:schemeClr val="tx1">
-                    <a:tint val="75000"/>
+                    <a:shade val="82000"/>
                   </a:schemeClr>
                 </a:solidFill>
               </a:defRPr>
@@ -1016,7 +1059,7 @@
               <a:defRPr sz="1600">
                 <a:solidFill>
                   <a:schemeClr val="tx1">
-                    <a:tint val="75000"/>
+                    <a:shade val="82000"/>
                   </a:schemeClr>
                 </a:solidFill>
               </a:defRPr>
@@ -1026,7 +1069,7 @@
               <a:defRPr sz="1600">
                 <a:solidFill>
                   <a:schemeClr val="tx1">
-                    <a:tint val="75000"/>
+                    <a:shade val="82000"/>
                   </a:schemeClr>
                 </a:solidFill>
               </a:defRPr>
@@ -1036,7 +1079,7 @@
               <a:defRPr sz="1600">
                 <a:solidFill>
                   <a:schemeClr val="tx1">
-                    <a:tint val="75000"/>
+                    <a:shade val="82000"/>
                   </a:schemeClr>
                 </a:solidFill>
               </a:defRPr>
@@ -1046,7 +1089,7 @@
               <a:defRPr sz="1600">
                 <a:solidFill>
                   <a:schemeClr val="tx1">
-                    <a:tint val="75000"/>
+                    <a:shade val="82000"/>
                   </a:schemeClr>
                 </a:solidFill>
               </a:defRPr>
@@ -1076,9 +1119,9 @@
           <a:bodyPr/>
           <a:lstStyle/>
           <a:p>
-            <a:fld id="{2F49F8D7-1DC4-4BDB-B6FA-14C4DF2E1043}" type="datetimeFigureOut">
+            <a:fld id="{72DA9259-FA67-4F94-A1FA-19D3606B534F}" type="datetimeFigureOut">
               <a:rPr lang="en-US" smtClean="0"/>
-              <a:t>9/28/2024</a:t>
+              <a:t>10/15/2024</a:t>
             </a:fld>
             <a:endParaRPr lang="en-US"/>
           </a:p>
@@ -1118,7 +1161,7 @@
           <a:bodyPr/>
           <a:lstStyle/>
           <a:p>
-            <a:fld id="{5D661ADA-AE8F-47E4-AB17-3C732F73DAF2}" type="slidenum">
+            <a:fld id="{5B43E8E4-2917-43F7-B6E9-46BEDD52166E}" type="slidenum">
               <a:rPr lang="en-US" smtClean="0"/>
               <a:t>‹#›</a:t>
             </a:fld>
@@ -1129,7 +1172,7 @@
     </p:spTree>
     <p:extLst>
       <p:ext uri="{BB962C8B-B14F-4D97-AF65-F5344CB8AC3E}">
-        <p14:creationId xmlns:p14="http://schemas.microsoft.com/office/powerpoint/2010/main" val="1402349965"/>
+        <p14:creationId xmlns:p14="http://schemas.microsoft.com/office/powerpoint/2010/main" val="1884960466"/>
       </p:ext>
     </p:extLst>
   </p:cSld>
@@ -1308,9 +1351,9 @@
           <a:bodyPr/>
           <a:lstStyle/>
           <a:p>
-            <a:fld id="{2F49F8D7-1DC4-4BDB-B6FA-14C4DF2E1043}" type="datetimeFigureOut">
+            <a:fld id="{72DA9259-FA67-4F94-A1FA-19D3606B534F}" type="datetimeFigureOut">
               <a:rPr lang="en-US" smtClean="0"/>
-              <a:t>9/28/2024</a:t>
+              <a:t>10/15/2024</a:t>
             </a:fld>
             <a:endParaRPr lang="en-US"/>
           </a:p>
@@ -1350,7 +1393,7 @@
           <a:bodyPr/>
           <a:lstStyle/>
           <a:p>
-            <a:fld id="{5D661ADA-AE8F-47E4-AB17-3C732F73DAF2}" type="slidenum">
+            <a:fld id="{5B43E8E4-2917-43F7-B6E9-46BEDD52166E}" type="slidenum">
               <a:rPr lang="en-US" smtClean="0"/>
               <a:t>‹#›</a:t>
             </a:fld>
@@ -1361,7 +1404,7 @@
     </p:spTree>
     <p:extLst>
       <p:ext uri="{BB962C8B-B14F-4D97-AF65-F5344CB8AC3E}">
-        <p14:creationId xmlns:p14="http://schemas.microsoft.com/office/powerpoint/2010/main" val="3365561557"/>
+        <p14:creationId xmlns:p14="http://schemas.microsoft.com/office/powerpoint/2010/main" val="2781537681"/>
       </p:ext>
     </p:extLst>
   </p:cSld>
@@ -1675,9 +1718,9 @@
           <a:bodyPr/>
           <a:lstStyle/>
           <a:p>
-            <a:fld id="{2F49F8D7-1DC4-4BDB-B6FA-14C4DF2E1043}" type="datetimeFigureOut">
+            <a:fld id="{72DA9259-FA67-4F94-A1FA-19D3606B534F}" type="datetimeFigureOut">
               <a:rPr lang="en-US" smtClean="0"/>
-              <a:t>9/28/2024</a:t>
+              <a:t>10/15/2024</a:t>
             </a:fld>
             <a:endParaRPr lang="en-US"/>
           </a:p>
@@ -1717,7 +1760,7 @@
           <a:bodyPr/>
           <a:lstStyle/>
           <a:p>
-            <a:fld id="{5D661ADA-AE8F-47E4-AB17-3C732F73DAF2}" type="slidenum">
+            <a:fld id="{5B43E8E4-2917-43F7-B6E9-46BEDD52166E}" type="slidenum">
               <a:rPr lang="en-US" smtClean="0"/>
               <a:t>‹#›</a:t>
             </a:fld>
@@ -1728,7 +1771,7 @@
     </p:spTree>
     <p:extLst>
       <p:ext uri="{BB962C8B-B14F-4D97-AF65-F5344CB8AC3E}">
-        <p14:creationId xmlns:p14="http://schemas.microsoft.com/office/powerpoint/2010/main" val="1874457318"/>
+        <p14:creationId xmlns:p14="http://schemas.microsoft.com/office/powerpoint/2010/main" val="2729265803"/>
       </p:ext>
     </p:extLst>
   </p:cSld>
@@ -1793,9 +1836,9 @@
           <a:bodyPr/>
           <a:lstStyle/>
           <a:p>
-            <a:fld id="{2F49F8D7-1DC4-4BDB-B6FA-14C4DF2E1043}" type="datetimeFigureOut">
+            <a:fld id="{72DA9259-FA67-4F94-A1FA-19D3606B534F}" type="datetimeFigureOut">
               <a:rPr lang="en-US" smtClean="0"/>
-              <a:t>9/28/2024</a:t>
+              <a:t>10/15/2024</a:t>
             </a:fld>
             <a:endParaRPr lang="en-US"/>
           </a:p>
@@ -1835,7 +1878,7 @@
           <a:bodyPr/>
           <a:lstStyle/>
           <a:p>
-            <a:fld id="{5D661ADA-AE8F-47E4-AB17-3C732F73DAF2}" type="slidenum">
+            <a:fld id="{5B43E8E4-2917-43F7-B6E9-46BEDD52166E}" type="slidenum">
               <a:rPr lang="en-US" smtClean="0"/>
               <a:t>‹#›</a:t>
             </a:fld>
@@ -1846,7 +1889,7 @@
     </p:spTree>
     <p:extLst>
       <p:ext uri="{BB962C8B-B14F-4D97-AF65-F5344CB8AC3E}">
-        <p14:creationId xmlns:p14="http://schemas.microsoft.com/office/powerpoint/2010/main" val="2394301081"/>
+        <p14:creationId xmlns:p14="http://schemas.microsoft.com/office/powerpoint/2010/main" val="1503131487"/>
       </p:ext>
     </p:extLst>
   </p:cSld>
@@ -1888,9 +1931,9 @@
           <a:bodyPr/>
           <a:lstStyle/>
           <a:p>
-            <a:fld id="{2F49F8D7-1DC4-4BDB-B6FA-14C4DF2E1043}" type="datetimeFigureOut">
+            <a:fld id="{72DA9259-FA67-4F94-A1FA-19D3606B534F}" type="datetimeFigureOut">
               <a:rPr lang="en-US" smtClean="0"/>
-              <a:t>9/28/2024</a:t>
+              <a:t>10/15/2024</a:t>
             </a:fld>
             <a:endParaRPr lang="en-US"/>
           </a:p>
@@ -1930,7 +1973,7 @@
           <a:bodyPr/>
           <a:lstStyle/>
           <a:p>
-            <a:fld id="{5D661ADA-AE8F-47E4-AB17-3C732F73DAF2}" type="slidenum">
+            <a:fld id="{5B43E8E4-2917-43F7-B6E9-46BEDD52166E}" type="slidenum">
               <a:rPr lang="en-US" smtClean="0"/>
               <a:t>‹#›</a:t>
             </a:fld>
@@ -1941,7 +1984,7 @@
     </p:spTree>
     <p:extLst>
       <p:ext uri="{BB962C8B-B14F-4D97-AF65-F5344CB8AC3E}">
-        <p14:creationId xmlns:p14="http://schemas.microsoft.com/office/powerpoint/2010/main" val="1288089909"/>
+        <p14:creationId xmlns:p14="http://schemas.microsoft.com/office/powerpoint/2010/main" val="2242397941"/>
       </p:ext>
     </p:extLst>
   </p:cSld>
@@ -2165,9 +2208,9 @@
           <a:bodyPr/>
           <a:lstStyle/>
           <a:p>
-            <a:fld id="{2F49F8D7-1DC4-4BDB-B6FA-14C4DF2E1043}" type="datetimeFigureOut">
+            <a:fld id="{72DA9259-FA67-4F94-A1FA-19D3606B534F}" type="datetimeFigureOut">
               <a:rPr lang="en-US" smtClean="0"/>
-              <a:t>9/28/2024</a:t>
+              <a:t>10/15/2024</a:t>
             </a:fld>
             <a:endParaRPr lang="en-US"/>
           </a:p>
@@ -2207,7 +2250,7 @@
           <a:bodyPr/>
           <a:lstStyle/>
           <a:p>
-            <a:fld id="{5D661ADA-AE8F-47E4-AB17-3C732F73DAF2}" type="slidenum">
+            <a:fld id="{5B43E8E4-2917-43F7-B6E9-46BEDD52166E}" type="slidenum">
               <a:rPr lang="en-US" smtClean="0"/>
               <a:t>‹#›</a:t>
             </a:fld>
@@ -2218,7 +2261,7 @@
     </p:spTree>
     <p:extLst>
       <p:ext uri="{BB962C8B-B14F-4D97-AF65-F5344CB8AC3E}">
-        <p14:creationId xmlns:p14="http://schemas.microsoft.com/office/powerpoint/2010/main" val="4044588762"/>
+        <p14:creationId xmlns:p14="http://schemas.microsoft.com/office/powerpoint/2010/main" val="4161339414"/>
       </p:ext>
     </p:extLst>
   </p:cSld>
@@ -2422,9 +2465,9 @@
           <a:bodyPr/>
           <a:lstStyle/>
           <a:p>
-            <a:fld id="{2F49F8D7-1DC4-4BDB-B6FA-14C4DF2E1043}" type="datetimeFigureOut">
+            <a:fld id="{72DA9259-FA67-4F94-A1FA-19D3606B534F}" type="datetimeFigureOut">
               <a:rPr lang="en-US" smtClean="0"/>
-              <a:t>9/28/2024</a:t>
+              <a:t>10/15/2024</a:t>
             </a:fld>
             <a:endParaRPr lang="en-US"/>
           </a:p>
@@ -2464,7 +2507,7 @@
           <a:bodyPr/>
           <a:lstStyle/>
           <a:p>
-            <a:fld id="{5D661ADA-AE8F-47E4-AB17-3C732F73DAF2}" type="slidenum">
+            <a:fld id="{5B43E8E4-2917-43F7-B6E9-46BEDD52166E}" type="slidenum">
               <a:rPr lang="en-US" smtClean="0"/>
               <a:t>‹#›</a:t>
             </a:fld>
@@ -2475,7 +2518,7 @@
     </p:spTree>
     <p:extLst>
       <p:ext uri="{BB962C8B-B14F-4D97-AF65-F5344CB8AC3E}">
-        <p14:creationId xmlns:p14="http://schemas.microsoft.com/office/powerpoint/2010/main" val="1198144989"/>
+        <p14:creationId xmlns:p14="http://schemas.microsoft.com/office/powerpoint/2010/main" val="3670061854"/>
       </p:ext>
     </p:extLst>
   </p:cSld>
@@ -2628,16 +2671,16 @@
               <a:defRPr sz="1200">
                 <a:solidFill>
                   <a:schemeClr val="tx1">
-                    <a:tint val="75000"/>
+                    <a:shade val="82000"/>
                   </a:schemeClr>
                 </a:solidFill>
               </a:defRPr>
             </a:lvl1pPr>
           </a:lstStyle>
           <a:p>
-            <a:fld id="{2F49F8D7-1DC4-4BDB-B6FA-14C4DF2E1043}" type="datetimeFigureOut">
+            <a:fld id="{72DA9259-FA67-4F94-A1FA-19D3606B534F}" type="datetimeFigureOut">
               <a:rPr lang="en-US" smtClean="0"/>
-              <a:t>9/28/2024</a:t>
+              <a:t>10/15/2024</a:t>
             </a:fld>
             <a:endParaRPr lang="en-US"/>
           </a:p>
@@ -2669,7 +2712,7 @@
               <a:defRPr sz="1200">
                 <a:solidFill>
                   <a:schemeClr val="tx1">
-                    <a:tint val="75000"/>
+                    <a:shade val="82000"/>
                   </a:schemeClr>
                 </a:solidFill>
               </a:defRPr>
@@ -2706,14 +2749,14 @@
               <a:defRPr sz="1200">
                 <a:solidFill>
                   <a:schemeClr val="tx1">
-                    <a:tint val="75000"/>
+                    <a:shade val="82000"/>
                   </a:schemeClr>
                 </a:solidFill>
               </a:defRPr>
             </a:lvl1pPr>
           </a:lstStyle>
           <a:p>
-            <a:fld id="{5D661ADA-AE8F-47E4-AB17-3C732F73DAF2}" type="slidenum">
+            <a:fld id="{5B43E8E4-2917-43F7-B6E9-46BEDD52166E}" type="slidenum">
               <a:rPr lang="en-US" smtClean="0"/>
               <a:t>‹#›</a:t>
             </a:fld>
@@ -2724,7 +2767,7 @@
     </p:spTree>
     <p:extLst>
       <p:ext uri="{BB962C8B-B14F-4D97-AF65-F5344CB8AC3E}">
-        <p14:creationId xmlns:p14="http://schemas.microsoft.com/office/powerpoint/2010/main" val="2276541113"/>
+        <p14:creationId xmlns:p14="http://schemas.microsoft.com/office/powerpoint/2010/main" val="985940737"/>
       </p:ext>
     </p:extLst>
   </p:cSld>
@@ -3030,13 +3073,7 @@
   <p:cSld>
     <p:spTree>
       <p:nvGrpSpPr>
-        <p:cNvPr id="1" name="">
-          <a:extLst>
-            <a:ext uri="{FF2B5EF4-FFF2-40B4-BE49-F238E27FC236}">
-              <a16:creationId xmlns:a16="http://schemas.microsoft.com/office/drawing/2014/main" id="{9810B86F-248C-A935-C6DF-62153682207E}"/>
-            </a:ext>
-          </a:extLst>
-        </p:cNvPr>
+        <p:cNvPr id="1" name=""/>
         <p:cNvGrpSpPr/>
         <p:nvPr/>
       </p:nvGrpSpPr>
@@ -3050,10 +3087,10 @@
       </p:grpSpPr>
       <p:sp>
         <p:nvSpPr>
-          <p:cNvPr id="3" name="Subtitle 2">
+          <p:cNvPr id="2" name="Title 1">
             <a:extLst>
               <a:ext uri="{FF2B5EF4-FFF2-40B4-BE49-F238E27FC236}">
-                <a16:creationId xmlns:a16="http://schemas.microsoft.com/office/drawing/2014/main" id="{E393FEF4-64A2-3209-71C7-85DC3AAB6E7F}"/>
+                <a16:creationId xmlns:a16="http://schemas.microsoft.com/office/drawing/2014/main" id="{BFDA464E-37E7-7D61-6E99-ACD35979E289}"/>
               </a:ext>
             </a:extLst>
           </p:cNvPr>
@@ -3061,97 +3098,52 @@
             <a:spLocks noGrp="1"/>
           </p:cNvSpPr>
           <p:nvPr>
-            <p:ph type="subTitle" idx="1"/>
+            <p:ph type="ctrTitle"/>
           </p:nvPr>
         </p:nvSpPr>
         <p:spPr>
           <a:xfrm>
-            <a:off x="0" y="-265043"/>
-            <a:ext cx="12192000" cy="7123043"/>
+            <a:off x="0" y="0"/>
+            <a:ext cx="12192000" cy="6858000"/>
           </a:xfrm>
         </p:spPr>
         <p:txBody>
-          <a:bodyPr vert="horz" lIns="91440" tIns="45720" rIns="91440" bIns="45720" rtlCol="0" anchor="t">
-            <a:noAutofit/>
-          </a:bodyPr>
-          <a:lstStyle/>
-          <a:p>
-            <a:endParaRPr lang="ru-RU" sz="5400" dirty="0"/>
-          </a:p>
-          <a:p>
-            <a:r>
-              <a:rPr lang="ru-RU" sz="5400" dirty="0">
-                <a:latin typeface="Times New Roman"/>
-                <a:cs typeface="Times New Roman"/>
-              </a:rPr>
-              <a:t>Господь есть мой свет, </a:t>
-            </a:r>
-          </a:p>
-          <a:p>
-            <a:r>
-              <a:rPr lang="ru-RU" sz="5400" dirty="0">
-                <a:latin typeface="Times New Roman"/>
-                <a:cs typeface="Times New Roman"/>
-              </a:rPr>
-              <a:t>Он мой свет, Спаситель мой, </a:t>
-            </a:r>
-          </a:p>
-          <a:p>
-            <a:r>
-              <a:rPr lang="ru-RU" sz="5400">
-                <a:latin typeface="Times New Roman"/>
-                <a:cs typeface="Times New Roman"/>
-              </a:rPr>
-              <a:t>я не страшусь. </a:t>
-            </a:r>
-          </a:p>
-          <a:p>
-            <a:r>
-              <a:rPr lang="ru-RU" sz="5400" dirty="0">
-                <a:latin typeface="Times New Roman"/>
-                <a:cs typeface="Times New Roman"/>
-              </a:rPr>
-              <a:t>Господь мой есть крепость </a:t>
-            </a:r>
-          </a:p>
-          <a:p>
-            <a:r>
-              <a:rPr lang="ru-RU" sz="5400" dirty="0">
-                <a:latin typeface="Times New Roman"/>
-                <a:cs typeface="Times New Roman"/>
-              </a:rPr>
-              <a:t>для жизни моей, </a:t>
-            </a:r>
-          </a:p>
-          <a:p>
-            <a:r>
-              <a:rPr lang="ru-RU" sz="5400" dirty="0">
-                <a:latin typeface="Times New Roman"/>
-                <a:cs typeface="Times New Roman"/>
-              </a:rPr>
-              <a:t>кого </a:t>
-            </a:r>
-            <a:r>
-              <a:rPr lang="ru-RU" sz="5400" dirty="0" err="1">
-                <a:latin typeface="Times New Roman"/>
-                <a:cs typeface="Times New Roman"/>
-              </a:rPr>
-              <a:t>убоюся</a:t>
-            </a:r>
-            <a:r>
-              <a:rPr lang="ru-RU" sz="5400" dirty="0">
-                <a:latin typeface="Times New Roman"/>
-                <a:cs typeface="Times New Roman"/>
-              </a:rPr>
-              <a:t> я? </a:t>
-            </a:r>
+          <a:bodyPr anchor="ctr"/>
+          <a:lstStyle/>
+          <a:p>
+            <a:r>
+              <a:rPr lang="ru-RU" dirty="0"/>
+              <a:t>Мне есть за что благодарить Творца</a:t>
+            </a:r>
+            <a:br>
+              <a:rPr lang="ru-RU" dirty="0"/>
+            </a:br>
+            <a:r>
+              <a:rPr lang="ru-RU" dirty="0"/>
+              <a:t>Он снял с меня греховную проказу</a:t>
+            </a:r>
+            <a:br>
+              <a:rPr lang="ru-RU" dirty="0"/>
+            </a:br>
+            <a:r>
+              <a:rPr lang="ru-RU" dirty="0"/>
+              <a:t>О пусть теперь польется без конца</a:t>
+            </a:r>
+            <a:br>
+              <a:rPr lang="ru-RU" dirty="0"/>
+            </a:br>
+            <a:r>
+              <a:rPr lang="ru-RU" dirty="0"/>
+              <a:t>Хвала ему в поэмах и рассказах</a:t>
+            </a:r>
+            <a:endParaRPr lang="en-US" dirty="0"/>
           </a:p>
         </p:txBody>
       </p:sp>
     </p:spTree>
     <p:extLst>
       <p:ext uri="{BB962C8B-B14F-4D97-AF65-F5344CB8AC3E}">
-        <p14:creationId xmlns:p14="http://schemas.microsoft.com/office/powerpoint/2010/main" val="1794953803"/>
+        <p14:creationId xmlns:p14="http://schemas.microsoft.com/office/powerpoint/2010/main" val="1889788063"/>
       </p:ext>
     </p:extLst>
   </p:cSld>
@@ -3180,10 +3172,10 @@
       </p:grpSpPr>
       <p:sp>
         <p:nvSpPr>
-          <p:cNvPr id="3" name="Subtitle 2">
+          <p:cNvPr id="2" name="Title 1">
             <a:extLst>
               <a:ext uri="{FF2B5EF4-FFF2-40B4-BE49-F238E27FC236}">
-                <a16:creationId xmlns:a16="http://schemas.microsoft.com/office/drawing/2014/main" id="{72DF2D19-D144-D52E-6A2C-B42F3297DCF3}"/>
+                <a16:creationId xmlns:a16="http://schemas.microsoft.com/office/drawing/2014/main" id="{BFDA464E-37E7-7D61-6E99-ACD35979E289}"/>
               </a:ext>
             </a:extLst>
           </p:cNvPr>
@@ -3191,7 +3183,7 @@
             <a:spLocks noGrp="1"/>
           </p:cNvSpPr>
           <p:nvPr>
-            <p:ph type="subTitle" idx="1"/>
+            <p:ph type="ctrTitle"/>
           </p:nvPr>
         </p:nvSpPr>
         <p:spPr>
@@ -3201,75 +3193,42 @@
           </a:xfrm>
         </p:spPr>
         <p:txBody>
-          <a:bodyPr vert="horz" lIns="91440" tIns="45720" rIns="91440" bIns="45720" rtlCol="0" anchor="t">
-            <a:noAutofit/>
-          </a:bodyPr>
-          <a:lstStyle/>
-          <a:p>
-            <a:endParaRPr lang="ru-RU" sz="5400" dirty="0"/>
-          </a:p>
-          <a:p>
-            <a:r>
-              <a:rPr lang="ru-RU" sz="5400" dirty="0">
-                <a:latin typeface="Times New Roman"/>
-                <a:cs typeface="Times New Roman"/>
-              </a:rPr>
-              <a:t>Войско ли нечестивых близко, </a:t>
-            </a:r>
-          </a:p>
-          <a:p>
-            <a:r>
-              <a:rPr lang="ru-RU" sz="5400" dirty="0">
-                <a:latin typeface="Times New Roman"/>
-                <a:cs typeface="Times New Roman"/>
-              </a:rPr>
-              <a:t>и я не страшусь.</a:t>
-            </a:r>
-          </a:p>
-          <a:p>
-            <a:r>
-              <a:rPr lang="ru-RU" sz="5400" dirty="0">
-                <a:latin typeface="Times New Roman"/>
-                <a:cs typeface="Times New Roman"/>
-              </a:rPr>
-              <a:t>Грозит ли враг войною, </a:t>
-            </a:r>
-          </a:p>
-          <a:p>
-            <a:r>
-              <a:rPr lang="ru-RU" sz="5400" dirty="0">
-                <a:latin typeface="Times New Roman"/>
-                <a:cs typeface="Times New Roman"/>
-              </a:rPr>
-              <a:t>на Бога надеюсь я. </a:t>
-            </a:r>
-          </a:p>
-          <a:p>
-            <a:r>
-              <a:rPr lang="ru-RU" sz="5400" dirty="0">
-                <a:latin typeface="Times New Roman"/>
-                <a:cs typeface="Times New Roman"/>
-              </a:rPr>
-              <a:t>Я одного лишь жду от Творца, </a:t>
-            </a:r>
-            <a:endParaRPr lang="ru-RU" dirty="0"/>
-          </a:p>
-          <a:p>
-            <a:r>
-              <a:rPr lang="ru-RU" sz="5400" dirty="0">
-                <a:latin typeface="Times New Roman"/>
-                <a:cs typeface="Times New Roman"/>
-              </a:rPr>
-              <a:t>одного я жду: </a:t>
-            </a:r>
-            <a:endParaRPr lang="ru-RU"/>
+          <a:bodyPr anchor="ctr"/>
+          <a:lstStyle/>
+          <a:p>
+            <a:r>
+              <a:rPr lang="ru-RU" dirty="0"/>
+              <a:t>Вот почему мне хочется любить</a:t>
+            </a:r>
+            <a:br>
+              <a:rPr lang="ru-RU" dirty="0"/>
+            </a:br>
+            <a:r>
+              <a:rPr lang="ru-RU" dirty="0"/>
+              <a:t>Его сильней, и искренней, и чище</a:t>
+            </a:r>
+            <a:br>
+              <a:rPr lang="ru-RU" dirty="0"/>
+            </a:br>
+            <a:r>
+              <a:rPr lang="ru-RU" dirty="0"/>
+              <a:t>Мне есть за что Христа благодарить</a:t>
+            </a:r>
+            <a:br>
+              <a:rPr lang="ru-RU" dirty="0"/>
+            </a:br>
+            <a:r>
+              <a:rPr lang="ru-RU" dirty="0"/>
+              <a:t>Он мне купил небесное жилище</a:t>
+            </a:r>
+            <a:endParaRPr lang="en-US" dirty="0"/>
           </a:p>
         </p:txBody>
       </p:sp>
     </p:spTree>
     <p:extLst>
       <p:ext uri="{BB962C8B-B14F-4D97-AF65-F5344CB8AC3E}">
-        <p14:creationId xmlns:p14="http://schemas.microsoft.com/office/powerpoint/2010/main" val="1741310931"/>
+        <p14:creationId xmlns:p14="http://schemas.microsoft.com/office/powerpoint/2010/main" val="3350942817"/>
       </p:ext>
     </p:extLst>
   </p:cSld>
@@ -3284,13 +3243,7 @@
   <p:cSld>
     <p:spTree>
       <p:nvGrpSpPr>
-        <p:cNvPr id="1" name="">
-          <a:extLst>
-            <a:ext uri="{FF2B5EF4-FFF2-40B4-BE49-F238E27FC236}">
-              <a16:creationId xmlns:a16="http://schemas.microsoft.com/office/drawing/2014/main" id="{05275A52-252B-C0CA-0547-205CF296A3CA}"/>
-            </a:ext>
-          </a:extLst>
-        </p:cNvPr>
+        <p:cNvPr id="1" name=""/>
         <p:cNvGrpSpPr/>
         <p:nvPr/>
       </p:nvGrpSpPr>
@@ -3304,10 +3257,10 @@
       </p:grpSpPr>
       <p:sp>
         <p:nvSpPr>
-          <p:cNvPr id="3" name="Subtitle 2">
+          <p:cNvPr id="2" name="Title 1">
             <a:extLst>
               <a:ext uri="{FF2B5EF4-FFF2-40B4-BE49-F238E27FC236}">
-                <a16:creationId xmlns:a16="http://schemas.microsoft.com/office/drawing/2014/main" id="{55CD1044-1DE7-DF1E-8B2E-9ABD534A280F}"/>
+                <a16:creationId xmlns:a16="http://schemas.microsoft.com/office/drawing/2014/main" id="{BFDA464E-37E7-7D61-6E99-ACD35979E289}"/>
               </a:ext>
             </a:extLst>
           </p:cNvPr>
@@ -3315,7 +3268,7 @@
             <a:spLocks noGrp="1"/>
           </p:cNvSpPr>
           <p:nvPr>
-            <p:ph type="subTitle" idx="1"/>
+            <p:ph type="ctrTitle"/>
           </p:nvPr>
         </p:nvSpPr>
         <p:spPr>
@@ -3325,78 +3278,308 @@
           </a:xfrm>
         </p:spPr>
         <p:txBody>
-          <a:bodyPr vert="horz" lIns="91440" tIns="45720" rIns="91440" bIns="45720" rtlCol="0" anchor="t">
-            <a:noAutofit/>
-          </a:bodyPr>
-          <a:lstStyle/>
-          <a:p>
-            <a:endParaRPr lang="ru-RU" sz="2800" dirty="0">
-              <a:ea typeface="Calibri"/>
-              <a:cs typeface="Calibri"/>
-            </a:endParaRPr>
-          </a:p>
-          <a:p>
-            <a:endParaRPr lang="ru-RU" sz="5400" dirty="0">
-              <a:latin typeface="Calibri" panose="020F0502020204030204"/>
-              <a:ea typeface="Calibri" panose="020F0502020204030204"/>
-              <a:cs typeface="Calibri" panose="020F0502020204030204"/>
-            </a:endParaRPr>
-          </a:p>
-          <a:p>
-            <a:r>
-              <a:rPr lang="ru-RU" sz="5400" dirty="0">
-                <a:latin typeface="Times New Roman"/>
-                <a:cs typeface="Times New Roman"/>
-              </a:rPr>
-              <a:t>Чтоб в доме Божьем </a:t>
-            </a:r>
-          </a:p>
-          <a:p>
-            <a:r>
-              <a:rPr lang="ru-RU" sz="5400" dirty="0">
-                <a:latin typeface="Times New Roman"/>
-                <a:cs typeface="Times New Roman"/>
-              </a:rPr>
-              <a:t>я мог пребывать </a:t>
-            </a:r>
-          </a:p>
-          <a:p>
-            <a:r>
-              <a:rPr lang="ru-RU" sz="5400" dirty="0">
-                <a:latin typeface="Times New Roman"/>
-                <a:cs typeface="Times New Roman"/>
-              </a:rPr>
-              <a:t>навсегда,</a:t>
-            </a:r>
-          </a:p>
-          <a:p>
-            <a:r>
-              <a:rPr lang="ru-RU" sz="5400" dirty="0">
-                <a:latin typeface="Times New Roman"/>
-                <a:cs typeface="Times New Roman"/>
-              </a:rPr>
-              <a:t>Аминь.</a:t>
-            </a:r>
-            <a:endParaRPr lang="en-US" sz="5400">
-              <a:latin typeface="Times New Roman"/>
-              <a:cs typeface="Times New Roman"/>
-            </a:endParaRPr>
-          </a:p>
-          <a:p>
-            <a:r>
-              <a:rPr lang="ru-RU" sz="5400" dirty="0">
-                <a:latin typeface="Times New Roman"/>
-                <a:cs typeface="Times New Roman"/>
-              </a:rPr>
-              <a:t>* * *</a:t>
-            </a:r>
+          <a:bodyPr anchor="ctr"/>
+          <a:lstStyle/>
+          <a:p>
+            <a:r>
+              <a:rPr lang="ru-RU" dirty="0"/>
+              <a:t>Душа взывать к Христу не устает</a:t>
+            </a:r>
+            <a:br>
+              <a:rPr lang="ru-RU" dirty="0"/>
+            </a:br>
+            <a:r>
+              <a:rPr lang="ru-RU" dirty="0"/>
+              <a:t>Где падала – прощения просила</a:t>
+            </a:r>
+            <a:br>
+              <a:rPr lang="ru-RU" dirty="0"/>
+            </a:br>
+            <a:r>
+              <a:rPr lang="ru-RU" dirty="0"/>
+              <a:t>Ведь Он в беде мне руку подает</a:t>
+            </a:r>
+            <a:br>
+              <a:rPr lang="ru-RU" dirty="0"/>
+            </a:br>
+            <a:r>
+              <a:rPr lang="ru-RU" dirty="0"/>
+              <a:t>Ведь Он один – прибежище и сила</a:t>
+            </a:r>
+            <a:endParaRPr lang="en-US" dirty="0"/>
           </a:p>
         </p:txBody>
       </p:sp>
     </p:spTree>
     <p:extLst>
       <p:ext uri="{BB962C8B-B14F-4D97-AF65-F5344CB8AC3E}">
-        <p14:creationId xmlns:p14="http://schemas.microsoft.com/office/powerpoint/2010/main" val="1666178883"/>
+        <p14:creationId xmlns:p14="http://schemas.microsoft.com/office/powerpoint/2010/main" val="292070290"/>
+      </p:ext>
+    </p:extLst>
+  </p:cSld>
+  <p:clrMapOvr>
+    <a:masterClrMapping/>
+  </p:clrMapOvr>
+</p:sld>
+</file>
+
+<file path=ppt/slides/slide4.xml><?xml version="1.0" encoding="utf-8"?>
+<p:sld xmlns:a="http://schemas.openxmlformats.org/drawingml/2006/main" xmlns:r="http://schemas.openxmlformats.org/officeDocument/2006/relationships" xmlns:p="http://schemas.openxmlformats.org/presentationml/2006/main">
+  <p:cSld>
+    <p:spTree>
+      <p:nvGrpSpPr>
+        <p:cNvPr id="1" name=""/>
+        <p:cNvGrpSpPr/>
+        <p:nvPr/>
+      </p:nvGrpSpPr>
+      <p:grpSpPr>
+        <a:xfrm>
+          <a:off x="0" y="0"/>
+          <a:ext cx="0" cy="0"/>
+          <a:chOff x="0" y="0"/>
+          <a:chExt cx="0" cy="0"/>
+        </a:xfrm>
+      </p:grpSpPr>
+      <p:sp>
+        <p:nvSpPr>
+          <p:cNvPr id="2" name="Title 1">
+            <a:extLst>
+              <a:ext uri="{FF2B5EF4-FFF2-40B4-BE49-F238E27FC236}">
+                <a16:creationId xmlns:a16="http://schemas.microsoft.com/office/drawing/2014/main" id="{BFDA464E-37E7-7D61-6E99-ACD35979E289}"/>
+              </a:ext>
+            </a:extLst>
+          </p:cNvPr>
+          <p:cNvSpPr>
+            <a:spLocks noGrp="1"/>
+          </p:cNvSpPr>
+          <p:nvPr>
+            <p:ph type="ctrTitle"/>
+          </p:nvPr>
+        </p:nvSpPr>
+        <p:spPr>
+          <a:xfrm>
+            <a:off x="0" y="0"/>
+            <a:ext cx="12192000" cy="6858000"/>
+          </a:xfrm>
+        </p:spPr>
+        <p:txBody>
+          <a:bodyPr anchor="ctr"/>
+          <a:lstStyle/>
+          <a:p>
+            <a:r>
+              <a:rPr lang="ru-RU" dirty="0"/>
+              <a:t>Вот почему мне хочется любить</a:t>
+            </a:r>
+            <a:br>
+              <a:rPr lang="ru-RU" dirty="0"/>
+            </a:br>
+            <a:r>
+              <a:rPr lang="ru-RU" dirty="0"/>
+              <a:t>Его сильней, и искренней, и чище</a:t>
+            </a:r>
+            <a:br>
+              <a:rPr lang="ru-RU" dirty="0"/>
+            </a:br>
+            <a:r>
+              <a:rPr lang="ru-RU" dirty="0"/>
+              <a:t>Мне есть за что Христа благодарить</a:t>
+            </a:r>
+            <a:br>
+              <a:rPr lang="ru-RU" dirty="0"/>
+            </a:br>
+            <a:r>
+              <a:rPr lang="ru-RU" dirty="0"/>
+              <a:t>Он мне купил небесное жилище</a:t>
+            </a:r>
+            <a:endParaRPr lang="en-US" dirty="0"/>
+          </a:p>
+        </p:txBody>
+      </p:sp>
+    </p:spTree>
+    <p:extLst>
+      <p:ext uri="{BB962C8B-B14F-4D97-AF65-F5344CB8AC3E}">
+        <p14:creationId xmlns:p14="http://schemas.microsoft.com/office/powerpoint/2010/main" val="3863399069"/>
+      </p:ext>
+    </p:extLst>
+  </p:cSld>
+  <p:clrMapOvr>
+    <a:masterClrMapping/>
+  </p:clrMapOvr>
+</p:sld>
+</file>
+
+<file path=ppt/slides/slide5.xml><?xml version="1.0" encoding="utf-8"?>
+<p:sld xmlns:a="http://schemas.openxmlformats.org/drawingml/2006/main" xmlns:r="http://schemas.openxmlformats.org/officeDocument/2006/relationships" xmlns:p="http://schemas.openxmlformats.org/presentationml/2006/main">
+  <p:cSld>
+    <p:spTree>
+      <p:nvGrpSpPr>
+        <p:cNvPr id="1" name=""/>
+        <p:cNvGrpSpPr/>
+        <p:nvPr/>
+      </p:nvGrpSpPr>
+      <p:grpSpPr>
+        <a:xfrm>
+          <a:off x="0" y="0"/>
+          <a:ext cx="0" cy="0"/>
+          <a:chOff x="0" y="0"/>
+          <a:chExt cx="0" cy="0"/>
+        </a:xfrm>
+      </p:grpSpPr>
+      <p:sp>
+        <p:nvSpPr>
+          <p:cNvPr id="2" name="Title 1">
+            <a:extLst>
+              <a:ext uri="{FF2B5EF4-FFF2-40B4-BE49-F238E27FC236}">
+                <a16:creationId xmlns:a16="http://schemas.microsoft.com/office/drawing/2014/main" id="{BFDA464E-37E7-7D61-6E99-ACD35979E289}"/>
+              </a:ext>
+            </a:extLst>
+          </p:cNvPr>
+          <p:cNvSpPr>
+            <a:spLocks noGrp="1"/>
+          </p:cNvSpPr>
+          <p:nvPr>
+            <p:ph type="ctrTitle"/>
+          </p:nvPr>
+        </p:nvSpPr>
+        <p:spPr>
+          <a:xfrm>
+            <a:off x="0" y="0"/>
+            <a:ext cx="12192000" cy="6858000"/>
+          </a:xfrm>
+        </p:spPr>
+        <p:txBody>
+          <a:bodyPr anchor="ctr"/>
+          <a:lstStyle/>
+          <a:p>
+            <a:r>
+              <a:rPr lang="ru-RU" dirty="0"/>
+              <a:t>Все от Него и все к Нему идет</a:t>
+            </a:r>
+            <a:br>
+              <a:rPr lang="ru-RU" dirty="0"/>
+            </a:br>
+            <a:r>
+              <a:rPr lang="ru-RU" dirty="0"/>
+              <a:t>Душа поет небесным отголоском</a:t>
+            </a:r>
+            <a:br>
+              <a:rPr lang="ru-RU" dirty="0"/>
+            </a:br>
+            <a:r>
+              <a:rPr lang="ru-RU" dirty="0"/>
+              <a:t>Придет в мой дом – я ноги обниму Того</a:t>
+            </a:r>
+            <a:br>
+              <a:rPr lang="ru-RU" dirty="0"/>
+            </a:br>
+            <a:r>
+              <a:rPr lang="ru-RU" dirty="0"/>
+              <a:t>Кто умер на кресте Голгофском</a:t>
+            </a:r>
+            <a:endParaRPr lang="en-US" dirty="0"/>
+          </a:p>
+        </p:txBody>
+      </p:sp>
+    </p:spTree>
+    <p:extLst>
+      <p:ext uri="{BB962C8B-B14F-4D97-AF65-F5344CB8AC3E}">
+        <p14:creationId xmlns:p14="http://schemas.microsoft.com/office/powerpoint/2010/main" val="3084808657"/>
+      </p:ext>
+    </p:extLst>
+  </p:cSld>
+  <p:clrMapOvr>
+    <a:masterClrMapping/>
+  </p:clrMapOvr>
+</p:sld>
+</file>
+
+<file path=ppt/slides/slide6.xml><?xml version="1.0" encoding="utf-8"?>
+<p:sld xmlns:a="http://schemas.openxmlformats.org/drawingml/2006/main" xmlns:r="http://schemas.openxmlformats.org/officeDocument/2006/relationships" xmlns:p="http://schemas.openxmlformats.org/presentationml/2006/main">
+  <p:cSld>
+    <p:spTree>
+      <p:nvGrpSpPr>
+        <p:cNvPr id="1" name=""/>
+        <p:cNvGrpSpPr/>
+        <p:nvPr/>
+      </p:nvGrpSpPr>
+      <p:grpSpPr>
+        <a:xfrm>
+          <a:off x="0" y="0"/>
+          <a:ext cx="0" cy="0"/>
+          <a:chOff x="0" y="0"/>
+          <a:chExt cx="0" cy="0"/>
+        </a:xfrm>
+      </p:grpSpPr>
+      <p:sp>
+        <p:nvSpPr>
+          <p:cNvPr id="2" name="Title 1">
+            <a:extLst>
+              <a:ext uri="{FF2B5EF4-FFF2-40B4-BE49-F238E27FC236}">
+                <a16:creationId xmlns:a16="http://schemas.microsoft.com/office/drawing/2014/main" id="{BFDA464E-37E7-7D61-6E99-ACD35979E289}"/>
+              </a:ext>
+            </a:extLst>
+          </p:cNvPr>
+          <p:cNvSpPr>
+            <a:spLocks noGrp="1"/>
+          </p:cNvSpPr>
+          <p:nvPr>
+            <p:ph type="ctrTitle"/>
+          </p:nvPr>
+        </p:nvSpPr>
+        <p:spPr>
+          <a:xfrm>
+            <a:off x="0" y="0"/>
+            <a:ext cx="12192000" cy="6858000"/>
+          </a:xfrm>
+        </p:spPr>
+        <p:txBody>
+          <a:bodyPr anchor="ctr"/>
+          <a:lstStyle/>
+          <a:p>
+            <a:r>
+              <a:rPr lang="ru-RU" dirty="0"/>
+              <a:t>Вот почему мне хочется любить</a:t>
+            </a:r>
+            <a:br>
+              <a:rPr lang="ru-RU" dirty="0"/>
+            </a:br>
+            <a:r>
+              <a:rPr lang="ru-RU" dirty="0"/>
+              <a:t>Его сильней, и искренней, и чище</a:t>
+            </a:r>
+            <a:br>
+              <a:rPr lang="ru-RU" dirty="0"/>
+            </a:br>
+            <a:r>
+              <a:rPr lang="ru-RU" dirty="0"/>
+              <a:t>Мне есть за что Христа благодарить</a:t>
+            </a:r>
+            <a:br>
+              <a:rPr lang="ru-RU" dirty="0"/>
+            </a:br>
+            <a:r>
+              <a:rPr lang="ru-RU" dirty="0"/>
+              <a:t>Он мне купил </a:t>
+            </a:r>
+            <a:r>
+              <a:rPr lang="ru-RU"/>
+              <a:t>небесное жилище</a:t>
+            </a:r>
+            <a:br>
+              <a:rPr lang="ru-RU"/>
+            </a:br>
+            <a:r>
+              <a:rPr lang="ru-RU"/>
+              <a:t>****</a:t>
+            </a:r>
+            <a:endParaRPr lang="en-US" dirty="0"/>
+          </a:p>
+        </p:txBody>
+      </p:sp>
+    </p:spTree>
+    <p:extLst>
+      <p:ext uri="{BB962C8B-B14F-4D97-AF65-F5344CB8AC3E}">
+        <p14:creationId xmlns:p14="http://schemas.microsoft.com/office/powerpoint/2010/main" val="9391457"/>
       </p:ext>
     </p:extLst>
   </p:cSld>
@@ -3407,7 +3590,7 @@
 </file>
 
 <file path=ppt/theme/theme1.xml><?xml version="1.0" encoding="utf-8"?>
-<a:theme xmlns:a="http://schemas.openxmlformats.org/drawingml/2006/main" name="Black (Songs)">
+<a:theme xmlns:a="http://schemas.openxmlformats.org/drawingml/2006/main" name="Office Theme">
   <a:themeElements>
     <a:clrScheme name="Office Theme">
       <a:dk1>
@@ -3417,39 +3600,39 @@
         <a:sysClr val="window" lastClr="FFFFFF"/>
       </a:lt1>
       <a:dk2>
-        <a:srgbClr val="44546A"/>
+        <a:srgbClr val="0E2841"/>
       </a:dk2>
       <a:lt2>
-        <a:srgbClr val="E7E6E6"/>
+        <a:srgbClr val="E8E8E8"/>
       </a:lt2>
       <a:accent1>
-        <a:srgbClr val="4472C4"/>
+        <a:srgbClr val="156082"/>
       </a:accent1>
       <a:accent2>
-        <a:srgbClr val="ED7D31"/>
+        <a:srgbClr val="E97132"/>
       </a:accent2>
       <a:accent3>
-        <a:srgbClr val="A5A5A5"/>
+        <a:srgbClr val="196B24"/>
       </a:accent3>
       <a:accent4>
-        <a:srgbClr val="FFC000"/>
+        <a:srgbClr val="0F9ED5"/>
       </a:accent4>
       <a:accent5>
-        <a:srgbClr val="5B9BD5"/>
+        <a:srgbClr val="A02B93"/>
       </a:accent5>
       <a:accent6>
-        <a:srgbClr val="70AD47"/>
+        <a:srgbClr val="4EA72E"/>
       </a:accent6>
       <a:hlink>
-        <a:srgbClr val="0563C1"/>
+        <a:srgbClr val="538D9D"/>
       </a:hlink>
       <a:folHlink>
-        <a:srgbClr val="954F72"/>
+        <a:srgbClr val="A5738E"/>
       </a:folHlink>
     </a:clrScheme>
     <a:fontScheme name="Office Theme">
       <a:majorFont>
-        <a:latin typeface="Calibri Light" panose="020F0302020204030204"/>
+        <a:latin typeface="Aptos Display" panose="02110004020202020204"/>
         <a:ea typeface=""/>
         <a:cs typeface=""/>
         <a:font script="Jpan" typeface="游ゴシック Light"/>
@@ -3482,9 +3665,26 @@
         <a:font script="Viet" typeface="Times New Roman"/>
         <a:font script="Uigh" typeface="Microsoft Uighur"/>
         <a:font script="Geor" typeface="Sylfaen"/>
+        <a:font script="Armn" typeface="Arial"/>
+        <a:font script="Bugi" typeface="Leelawadee UI"/>
+        <a:font script="Bopo" typeface="Microsoft JhengHei"/>
+        <a:font script="Java" typeface="Javanese Text"/>
+        <a:font script="Lisu" typeface="Segoe UI"/>
+        <a:font script="Mymr" typeface="Myanmar Text"/>
+        <a:font script="Nkoo" typeface="Ebrima"/>
+        <a:font script="Olck" typeface="Nirmala UI"/>
+        <a:font script="Osma" typeface="Ebrima"/>
+        <a:font script="Phag" typeface="Phagspa"/>
+        <a:font script="Syrn" typeface="Estrangelo Edessa"/>
+        <a:font script="Syrj" typeface="Estrangelo Edessa"/>
+        <a:font script="Syre" typeface="Estrangelo Edessa"/>
+        <a:font script="Sora" typeface="Nirmala UI"/>
+        <a:font script="Tale" typeface="Microsoft Tai Le"/>
+        <a:font script="Talu" typeface="Microsoft New Tai Lue"/>
+        <a:font script="Tfng" typeface="Ebrima"/>
       </a:majorFont>
       <a:minorFont>
-        <a:latin typeface="Calibri" panose="020F0502020204030204"/>
+        <a:latin typeface="Aptos" panose="02110004020202020204"/>
         <a:ea typeface=""/>
         <a:cs typeface=""/>
         <a:font script="Jpan" typeface="游ゴシック"/>
@@ -3517,6 +3717,23 @@
         <a:font script="Viet" typeface="Arial"/>
         <a:font script="Uigh" typeface="Microsoft Uighur"/>
         <a:font script="Geor" typeface="Sylfaen"/>
+        <a:font script="Armn" typeface="Arial"/>
+        <a:font script="Bugi" typeface="Leelawadee UI"/>
+        <a:font script="Bopo" typeface="Microsoft JhengHei"/>
+        <a:font script="Java" typeface="Javanese Text"/>
+        <a:font script="Lisu" typeface="Segoe UI"/>
+        <a:font script="Mymr" typeface="Myanmar Text"/>
+        <a:font script="Nkoo" typeface="Ebrima"/>
+        <a:font script="Olck" typeface="Nirmala UI"/>
+        <a:font script="Osma" typeface="Ebrima"/>
+        <a:font script="Phag" typeface="Phagspa"/>
+        <a:font script="Syrn" typeface="Estrangelo Edessa"/>
+        <a:font script="Syrj" typeface="Estrangelo Edessa"/>
+        <a:font script="Syre" typeface="Estrangelo Edessa"/>
+        <a:font script="Sora" typeface="Nirmala UI"/>
+        <a:font script="Tale" typeface="Microsoft Tai Le"/>
+        <a:font script="Talu" typeface="Microsoft New Tai Lue"/>
+        <a:font script="Tfng" typeface="Ebrima"/>
       </a:minorFont>
     </a:fontScheme>
     <a:fmtScheme name="Office Theme">
@@ -3578,13 +3795,6 @@
         </a:gradFill>
       </a:fillStyleLst>
       <a:lnStyleLst>
-        <a:ln w="6350" cap="flat" cmpd="sng" algn="ctr">
-          <a:solidFill>
-            <a:schemeClr val="phClr"/>
-          </a:solidFill>
-          <a:prstDash val="solid"/>
-          <a:miter lim="800000"/>
-        </a:ln>
         <a:ln w="12700" cap="flat" cmpd="sng" algn="ctr">
           <a:solidFill>
             <a:schemeClr val="phClr"/>
@@ -3593,6 +3803,13 @@
           <a:miter lim="800000"/>
         </a:ln>
         <a:ln w="19050" cap="flat" cmpd="sng" algn="ctr">
+          <a:solidFill>
+            <a:schemeClr val="phClr"/>
+          </a:solidFill>
+          <a:prstDash val="solid"/>
+          <a:miter lim="800000"/>
+        </a:ln>
+        <a:ln w="25400" cap="flat" cmpd="sng" algn="ctr">
           <a:solidFill>
             <a:schemeClr val="phClr"/>
           </a:solidFill>
@@ -3657,37 +3874,37 @@
       </a:bgFillStyleLst>
     </a:fmtScheme>
   </a:themeElements>
-  <a:objectDefaults/>
+  <a:objectDefaults>
+    <a:lnDef>
+      <a:spPr/>
+      <a:bodyPr/>
+      <a:lstStyle/>
+      <a:style>
+        <a:lnRef idx="2">
+          <a:schemeClr val="accent1"/>
+        </a:lnRef>
+        <a:fillRef idx="0">
+          <a:schemeClr val="accent1"/>
+        </a:fillRef>
+        <a:effectRef idx="1">
+          <a:schemeClr val="accent1"/>
+        </a:effectRef>
+        <a:fontRef idx="minor">
+          <a:schemeClr val="tx1"/>
+        </a:fontRef>
+      </a:style>
+    </a:lnDef>
+  </a:objectDefaults>
   <a:extraClrSchemeLst/>
   <a:extLst>
     <a:ext uri="{05A4C25C-085E-4340-85A3-A5531E510DB2}">
-      <thm15:themeFamily xmlns:thm15="http://schemas.microsoft.com/office/thememl/2012/main" name="Black (Songs)" id="{3E87F92E-BED9-40B0-BBC7-8EF4CEE3AC8F}" vid="{D85FB571-3308-477D-8254-63ED22C5F31C}"/>
+      <thm15:themeFamily xmlns:thm15="http://schemas.microsoft.com/office/thememl/2012/main" name="Office Theme" id="{2E142A2C-CD16-42D6-873A-C26D2A0506FA}" vid="{3A418E6B-C5F0-4B95-8D77-61E3EF3B5DF5}"/>
     </a:ext>
   </a:extLst>
 </a:theme>
 </file>
 
 <file path=customXml/item1.xml><?xml version="1.0" encoding="utf-8"?>
-<p:properties xmlns:p="http://schemas.microsoft.com/office/2006/metadata/properties" xmlns:xsi="http://www.w3.org/2001/XMLSchema-instance" xmlns:pc="http://schemas.microsoft.com/office/infopath/2007/PartnerControls">
-  <documentManagement>
-    <lcf76f155ced4ddcb4097134ff3c332f xmlns="243caec2-9363-411a-869a-ae66e37ba368">
-      <Terms xmlns="http://schemas.microsoft.com/office/infopath/2007/PartnerControls"/>
-    </lcf76f155ced4ddcb4097134ff3c332f>
-    <TaxCatchAll xmlns="91cc1edd-99ef-4741-81f4-b80eafe2ebea" xsi:nil="true"/>
-  </documentManagement>
-</p:properties>
-</file>
-
-<file path=customXml/item2.xml><?xml version="1.0" encoding="utf-8"?>
-<?mso-contentType ?>
-<FormTemplates xmlns="http://schemas.microsoft.com/sharepoint/v3/contenttype/forms">
-  <Display>DocumentLibraryForm</Display>
-  <Edit>DocumentLibraryForm</Edit>
-  <New>DocumentLibraryForm</New>
-</FormTemplates>
-</file>
-
-<file path=customXml/item3.xml><?xml version="1.0" encoding="utf-8"?>
 <ct:contentTypeSchema xmlns:ct="http://schemas.microsoft.com/office/2006/metadata/contentType" xmlns:ma="http://schemas.microsoft.com/office/2006/metadata/properties/metaAttributes" ct:_="" ma:_="" ma:contentTypeName="Document" ma:contentTypeID="0x010100FF98BBFE1FD9F848B9788794183D28CA" ma:contentTypeVersion="12" ma:contentTypeDescription="Create a new document." ma:contentTypeScope="" ma:versionID="04676cb7d259ef94b0a85868097fefb1">
   <xsd:schema xmlns:xsd="http://www.w3.org/2001/XMLSchema" xmlns:xs="http://www.w3.org/2001/XMLSchema" xmlns:p="http://schemas.microsoft.com/office/2006/metadata/properties" xmlns:ns2="243caec2-9363-411a-869a-ae66e37ba368" xmlns:ns3="91cc1edd-99ef-4741-81f4-b80eafe2ebea" targetNamespace="http://schemas.microsoft.com/office/2006/metadata/properties" ma:root="true" ma:fieldsID="a5cb952bc36c82b84636f1d4d03cfe1e" ns2:_="" ns3:_="">
     <xsd:import namespace="243caec2-9363-411a-869a-ae66e37ba368"/>
@@ -3888,40 +4105,34 @@
 </ct:contentTypeSchema>
 </file>
 
+<file path=customXml/item2.xml><?xml version="1.0" encoding="utf-8"?>
+<?mso-contentType ?>
+<FormTemplates xmlns="http://schemas.microsoft.com/sharepoint/v3/contenttype/forms">
+  <Display>DocumentLibraryForm</Display>
+  <Edit>DocumentLibraryForm</Edit>
+  <New>DocumentLibraryForm</New>
+</FormTemplates>
+</file>
+
+<file path=customXml/item3.xml><?xml version="1.0" encoding="utf-8"?>
+<p:properties xmlns:p="http://schemas.microsoft.com/office/2006/metadata/properties" xmlns:xsi="http://www.w3.org/2001/XMLSchema-instance" xmlns:pc="http://schemas.microsoft.com/office/infopath/2007/PartnerControls">
+  <documentManagement>
+    <lcf76f155ced4ddcb4097134ff3c332f xmlns="243caec2-9363-411a-869a-ae66e37ba368">
+      <Terms xmlns="http://schemas.microsoft.com/office/infopath/2007/PartnerControls"/>
+    </lcf76f155ced4ddcb4097134ff3c332f>
+    <TaxCatchAll xmlns="91cc1edd-99ef-4741-81f4-b80eafe2ebea" xsi:nil="true"/>
+  </documentManagement>
+</p:properties>
+</file>
+
 <file path=customXml/itemProps1.xml><?xml version="1.0" encoding="utf-8"?>
-<ds:datastoreItem xmlns:ds="http://schemas.openxmlformats.org/officeDocument/2006/customXml" ds:itemID="{975823BA-DE42-45EE-A2BD-2B3C21CC6510}">
-  <ds:schemaRefs>
-    <ds:schemaRef ds:uri="http://schemas.microsoft.com/office/2006/metadata/properties"/>
-    <ds:schemaRef ds:uri="http://schemas.microsoft.com/office/infopath/2007/PartnerControls"/>
-    <ds:schemaRef ds:uri="243caec2-9363-411a-869a-ae66e37ba368"/>
-    <ds:schemaRef ds:uri="91cc1edd-99ef-4741-81f4-b80eafe2ebea"/>
-  </ds:schemaRefs>
-</ds:datastoreItem>
+<ds:datastoreItem xmlns:ds="http://schemas.openxmlformats.org/officeDocument/2006/customXml" ds:itemID="{BC0C9DC6-6E86-4609-9710-11B7A18B24E0}"/>
 </file>
 
 <file path=customXml/itemProps2.xml><?xml version="1.0" encoding="utf-8"?>
-<ds:datastoreItem xmlns:ds="http://schemas.openxmlformats.org/officeDocument/2006/customXml" ds:itemID="{FCEB8631-8890-4318-A2E8-CD0D3034A253}">
-  <ds:schemaRefs>
-    <ds:schemaRef ds:uri="http://schemas.microsoft.com/sharepoint/v3/contenttype/forms"/>
-  </ds:schemaRefs>
-</ds:datastoreItem>
+<ds:datastoreItem xmlns:ds="http://schemas.openxmlformats.org/officeDocument/2006/customXml" ds:itemID="{58960387-ACDC-4C9B-BD8C-3B3E4AB7D362}"/>
 </file>
 
 <file path=customXml/itemProps3.xml><?xml version="1.0" encoding="utf-8"?>
-<ds:datastoreItem xmlns:ds="http://schemas.openxmlformats.org/officeDocument/2006/customXml" ds:itemID="{6D87981A-65A6-48CC-B5AE-69B24FE3A632}">
-  <ds:schemaRefs>
-    <ds:schemaRef ds:uri="http://schemas.microsoft.com/office/2006/metadata/contentType"/>
-    <ds:schemaRef ds:uri="http://schemas.microsoft.com/office/2006/metadata/properties/metaAttributes"/>
-    <ds:schemaRef ds:uri="http://www.w3.org/2001/XMLSchema"/>
-    <ds:schemaRef ds:uri="http://schemas.microsoft.com/office/2006/metadata/properties"/>
-    <ds:schemaRef ds:uri="243caec2-9363-411a-869a-ae66e37ba368"/>
-    <ds:schemaRef ds:uri="91cc1edd-99ef-4741-81f4-b80eafe2ebea"/>
-    <ds:schemaRef ds:uri="http://schemas.microsoft.com/office/2006/documentManagement/types"/>
-    <ds:schemaRef ds:uri="http://schemas.microsoft.com/office/infopath/2007/PartnerControls"/>
-    <ds:schemaRef ds:uri="http://schemas.openxmlformats.org/package/2006/metadata/core-properties"/>
-    <ds:schemaRef ds:uri="http://purl.org/dc/elements/1.1/"/>
-    <ds:schemaRef ds:uri="http://purl.org/dc/terms/"/>
-    <ds:schemaRef ds:uri="http://schemas.microsoft.com/internal/obd"/>
-  </ds:schemaRefs>
-</ds:datastoreItem>
+<ds:datastoreItem xmlns:ds="http://schemas.openxmlformats.org/officeDocument/2006/customXml" ds:itemID="{5B2702A9-D436-40BD-9F3B-5B13F1D8332D}"/>
 </file>
</xml_diff>

<commit_message>
saves and converts the files successfully in correct format
</commit_message>
<xml_diff>
--- a/powerpoint.pptx
+++ b/powerpoint.pptx
@@ -2,15 +2,12 @@
 <file path=ppt/presentation.xml><?xml version="1.0" encoding="utf-8"?>
 <p:presentation xmlns:a="http://schemas.openxmlformats.org/drawingml/2006/main" xmlns:r="http://schemas.openxmlformats.org/officeDocument/2006/relationships" xmlns:p="http://schemas.openxmlformats.org/presentationml/2006/main" saveSubsetFonts="1">
   <p:sldMasterIdLst>
-    <p:sldMasterId id="2147483660" r:id="rId1"/>
+    <p:sldMasterId id="2147483660" r:id="rId4"/>
   </p:sldMasterIdLst>
   <p:sldIdLst>
-    <p:sldId id="256" r:id="rId2"/>
-    <p:sldId id="257" r:id="rId3"/>
-    <p:sldId id="258" r:id="rId4"/>
-    <p:sldId id="259" r:id="rId5"/>
-    <p:sldId id="260" r:id="rId6"/>
-    <p:sldId id="261" r:id="rId7"/>
+    <p:sldId id="257" r:id="rId5"/>
+    <p:sldId id="256" r:id="rId6"/>
+    <p:sldId id="258" r:id="rId7"/>
   </p:sldIdLst>
   <p:sldSz cx="12192000" cy="6858000"/>
   <p:notesSz cx="6858000" cy="9144000"/>
@@ -109,13 +106,18 @@
       </a:defRPr>
     </a:lvl9pPr>
   </p:defaultTextStyle>
+  <p:extLst>
+    <p:ext uri="{EFAFB233-063F-42B5-8137-9DF3F51BA10A}">
+      <p15:sldGuideLst xmlns:p15="http://schemas.microsoft.com/office/powerpoint/2012/main"/>
+    </p:ext>
+  </p:extLst>
 </p:presentation>
 </file>
 
 <file path=ppt/revisionInfo.xml><?xml version="1.0" encoding="utf-8"?>
 <p1510:revInfo xmlns:a="http://schemas.openxmlformats.org/drawingml/2006/main" xmlns:r="http://schemas.openxmlformats.org/officeDocument/2006/relationships" xmlns:p1510="http://schemas.microsoft.com/office/powerpoint/2015/10/main">
   <p1510:revLst>
-    <p1510:client id="{45152F7D-D0CD-4896-8216-CF693B4E6BDD}" v="6" dt="2024-10-16T00:03:14.525"/>
+    <p1510:client id="{ACF0E746-F6F1-328A-3A1F-1D69FD81E48B}" v="24" dt="2024-09-29T04:58:11.358"/>
   </p1510:revLst>
 </p1510:revInfo>
 </file>
@@ -123,99 +125,54 @@
 <file path=ppt/changesInfos/changesInfo1.xml><?xml version="1.0" encoding="utf-8"?>
 <pc:chgInfo xmlns:a="http://schemas.openxmlformats.org/drawingml/2006/main" xmlns:r="http://schemas.openxmlformats.org/officeDocument/2006/relationships" xmlns:ac="http://schemas.microsoft.com/office/drawing/2013/main/command" xmlns:pc="http://schemas.microsoft.com/office/powerpoint/2013/main/command">
   <pc:docChgLst>
-    <pc:chgData name="Mark Litvinov" userId="d5f8790f-236b-448e-bffb-d2fa8ceb5943" providerId="ADAL" clId="{45152F7D-D0CD-4896-8216-CF693B4E6BDD}"/>
-    <pc:docChg chg="custSel addSld modSld">
-      <pc:chgData name="Mark Litvinov" userId="d5f8790f-236b-448e-bffb-d2fa8ceb5943" providerId="ADAL" clId="{45152F7D-D0CD-4896-8216-CF693B4E6BDD}" dt="2024-10-16T00:03:16.928" v="590" actId="20577"/>
+    <pc:chgData name="Anna Ignatenkov" userId="S::aignatenkov@tulsafsbc.org::794aa5f8-af34-4d66-af3d-9c6e9c27b802" providerId="AD" clId="Web-{ACF0E746-F6F1-328A-3A1F-1D69FD81E48B}"/>
+    <pc:docChg chg="modSld">
+      <pc:chgData name="Anna Ignatenkov" userId="S::aignatenkov@tulsafsbc.org::794aa5f8-af34-4d66-af3d-9c6e9c27b802" providerId="AD" clId="Web-{ACF0E746-F6F1-328A-3A1F-1D69FD81E48B}" dt="2024-09-29T04:58:11.358" v="20" actId="20577"/>
       <pc:docMkLst>
         <pc:docMk/>
       </pc:docMkLst>
-      <pc:sldChg chg="delSp modSp new mod">
-        <pc:chgData name="Mark Litvinov" userId="d5f8790f-236b-448e-bffb-d2fa8ceb5943" providerId="ADAL" clId="{45152F7D-D0CD-4896-8216-CF693B4E6BDD}" dt="2024-10-16T00:01:15.858" v="151" actId="20577"/>
+      <pc:sldChg chg="modSp">
+        <pc:chgData name="Anna Ignatenkov" userId="S::aignatenkov@tulsafsbc.org::794aa5f8-af34-4d66-af3d-9c6e9c27b802" providerId="AD" clId="Web-{ACF0E746-F6F1-328A-3A1F-1D69FD81E48B}" dt="2024-09-29T04:58:01.373" v="19" actId="20577"/>
         <pc:sldMkLst>
           <pc:docMk/>
-          <pc:sldMk cId="1889788063" sldId="256"/>
+          <pc:sldMk cId="1741310931" sldId="256"/>
         </pc:sldMkLst>
         <pc:spChg chg="mod">
-          <ac:chgData name="Mark Litvinov" userId="d5f8790f-236b-448e-bffb-d2fa8ceb5943" providerId="ADAL" clId="{45152F7D-D0CD-4896-8216-CF693B4E6BDD}" dt="2024-10-16T00:01:15.858" v="151" actId="20577"/>
+          <ac:chgData name="Anna Ignatenkov" userId="S::aignatenkov@tulsafsbc.org::794aa5f8-af34-4d66-af3d-9c6e9c27b802" providerId="AD" clId="Web-{ACF0E746-F6F1-328A-3A1F-1D69FD81E48B}" dt="2024-09-29T04:58:01.373" v="19" actId="20577"/>
           <ac:spMkLst>
             <pc:docMk/>
-            <pc:sldMk cId="1889788063" sldId="256"/>
-            <ac:spMk id="2" creationId="{BFDA464E-37E7-7D61-6E99-ACD35979E289}"/>
-          </ac:spMkLst>
-        </pc:spChg>
-        <pc:spChg chg="del mod">
-          <ac:chgData name="Mark Litvinov" userId="d5f8790f-236b-448e-bffb-d2fa8ceb5943" providerId="ADAL" clId="{45152F7D-D0CD-4896-8216-CF693B4E6BDD}" dt="2024-10-16T00:00:10.400" v="2" actId="478"/>
-          <ac:spMkLst>
-            <pc:docMk/>
-            <pc:sldMk cId="1889788063" sldId="256"/>
-            <ac:spMk id="3" creationId="{13472508-720D-710B-BE1D-87F574133529}"/>
+            <pc:sldMk cId="1741310931" sldId="256"/>
+            <ac:spMk id="3" creationId="{72DF2D19-D144-D52E-6A2C-B42F3297DCF3}"/>
           </ac:spMkLst>
         </pc:spChg>
       </pc:sldChg>
-      <pc:sldChg chg="modSp add mod">
-        <pc:chgData name="Mark Litvinov" userId="d5f8790f-236b-448e-bffb-d2fa8ceb5943" providerId="ADAL" clId="{45152F7D-D0CD-4896-8216-CF693B4E6BDD}" dt="2024-10-16T00:01:55.533" v="299" actId="20577"/>
+      <pc:sldChg chg="modSp">
+        <pc:chgData name="Anna Ignatenkov" userId="S::aignatenkov@tulsafsbc.org::794aa5f8-af34-4d66-af3d-9c6e9c27b802" providerId="AD" clId="Web-{ACF0E746-F6F1-328A-3A1F-1D69FD81E48B}" dt="2024-09-29T04:58:11.358" v="20" actId="20577"/>
         <pc:sldMkLst>
           <pc:docMk/>
-          <pc:sldMk cId="3350942817" sldId="257"/>
+          <pc:sldMk cId="1794953803" sldId="257"/>
         </pc:sldMkLst>
         <pc:spChg chg="mod">
-          <ac:chgData name="Mark Litvinov" userId="d5f8790f-236b-448e-bffb-d2fa8ceb5943" providerId="ADAL" clId="{45152F7D-D0CD-4896-8216-CF693B4E6BDD}" dt="2024-10-16T00:01:55.533" v="299" actId="20577"/>
+          <ac:chgData name="Anna Ignatenkov" userId="S::aignatenkov@tulsafsbc.org::794aa5f8-af34-4d66-af3d-9c6e9c27b802" providerId="AD" clId="Web-{ACF0E746-F6F1-328A-3A1F-1D69FD81E48B}" dt="2024-09-29T04:58:11.358" v="20" actId="20577"/>
           <ac:spMkLst>
             <pc:docMk/>
-            <pc:sldMk cId="3350942817" sldId="257"/>
-            <ac:spMk id="2" creationId="{BFDA464E-37E7-7D61-6E99-ACD35979E289}"/>
+            <pc:sldMk cId="1794953803" sldId="257"/>
+            <ac:spMk id="3" creationId="{E393FEF4-64A2-3209-71C7-85DC3AAB6E7F}"/>
           </ac:spMkLst>
         </pc:spChg>
       </pc:sldChg>
-      <pc:sldChg chg="modSp add mod">
-        <pc:chgData name="Mark Litvinov" userId="d5f8790f-236b-448e-bffb-d2fa8ceb5943" providerId="ADAL" clId="{45152F7D-D0CD-4896-8216-CF693B4E6BDD}" dt="2024-10-16T00:02:33.658" v="447" actId="20577"/>
+      <pc:sldChg chg="modSp">
+        <pc:chgData name="Anna Ignatenkov" userId="S::aignatenkov@tulsafsbc.org::794aa5f8-af34-4d66-af3d-9c6e9c27b802" providerId="AD" clId="Web-{ACF0E746-F6F1-328A-3A1F-1D69FD81E48B}" dt="2024-09-29T04:57:27.544" v="15" actId="20577"/>
         <pc:sldMkLst>
           <pc:docMk/>
-          <pc:sldMk cId="292070290" sldId="258"/>
+          <pc:sldMk cId="1666178883" sldId="258"/>
         </pc:sldMkLst>
         <pc:spChg chg="mod">
-          <ac:chgData name="Mark Litvinov" userId="d5f8790f-236b-448e-bffb-d2fa8ceb5943" providerId="ADAL" clId="{45152F7D-D0CD-4896-8216-CF693B4E6BDD}" dt="2024-10-16T00:02:33.658" v="447" actId="20577"/>
+          <ac:chgData name="Anna Ignatenkov" userId="S::aignatenkov@tulsafsbc.org::794aa5f8-af34-4d66-af3d-9c6e9c27b802" providerId="AD" clId="Web-{ACF0E746-F6F1-328A-3A1F-1D69FD81E48B}" dt="2024-09-29T04:57:27.544" v="15" actId="20577"/>
           <ac:spMkLst>
             <pc:docMk/>
-            <pc:sldMk cId="292070290" sldId="258"/>
-            <ac:spMk id="2" creationId="{BFDA464E-37E7-7D61-6E99-ACD35979E289}"/>
-          </ac:spMkLst>
-        </pc:spChg>
-      </pc:sldChg>
-      <pc:sldChg chg="add">
-        <pc:chgData name="Mark Litvinov" userId="d5f8790f-236b-448e-bffb-d2fa8ceb5943" providerId="ADAL" clId="{45152F7D-D0CD-4896-8216-CF693B4E6BDD}" dt="2024-10-16T00:02:35.892" v="448"/>
-        <pc:sldMkLst>
-          <pc:docMk/>
-          <pc:sldMk cId="3863399069" sldId="259"/>
-        </pc:sldMkLst>
-      </pc:sldChg>
-      <pc:sldChg chg="modSp add mod">
-        <pc:chgData name="Mark Litvinov" userId="d5f8790f-236b-448e-bffb-d2fa8ceb5943" providerId="ADAL" clId="{45152F7D-D0CD-4896-8216-CF693B4E6BDD}" dt="2024-10-16T00:03:11.236" v="584" actId="20577"/>
-        <pc:sldMkLst>
-          <pc:docMk/>
-          <pc:sldMk cId="3084808657" sldId="260"/>
-        </pc:sldMkLst>
-        <pc:spChg chg="mod">
-          <ac:chgData name="Mark Litvinov" userId="d5f8790f-236b-448e-bffb-d2fa8ceb5943" providerId="ADAL" clId="{45152F7D-D0CD-4896-8216-CF693B4E6BDD}" dt="2024-10-16T00:03:11.236" v="584" actId="20577"/>
-          <ac:spMkLst>
-            <pc:docMk/>
-            <pc:sldMk cId="3084808657" sldId="260"/>
-            <ac:spMk id="2" creationId="{BFDA464E-37E7-7D61-6E99-ACD35979E289}"/>
-          </ac:spMkLst>
-        </pc:spChg>
-      </pc:sldChg>
-      <pc:sldChg chg="modSp add mod">
-        <pc:chgData name="Mark Litvinov" userId="d5f8790f-236b-448e-bffb-d2fa8ceb5943" providerId="ADAL" clId="{45152F7D-D0CD-4896-8216-CF693B4E6BDD}" dt="2024-10-16T00:03:16.928" v="590" actId="20577"/>
-        <pc:sldMkLst>
-          <pc:docMk/>
-          <pc:sldMk cId="9391457" sldId="261"/>
-        </pc:sldMkLst>
-        <pc:spChg chg="mod">
-          <ac:chgData name="Mark Litvinov" userId="d5f8790f-236b-448e-bffb-d2fa8ceb5943" providerId="ADAL" clId="{45152F7D-D0CD-4896-8216-CF693B4E6BDD}" dt="2024-10-16T00:03:16.928" v="590" actId="20577"/>
-          <ac:spMkLst>
-            <pc:docMk/>
-            <pc:sldMk cId="9391457" sldId="261"/>
-            <ac:spMk id="2" creationId="{BFDA464E-37E7-7D61-6E99-ACD35979E289}"/>
+            <pc:sldMk cId="1666178883" sldId="258"/>
+            <ac:spMk id="3" creationId="{55CD1044-1DE7-DF1E-8B2E-9ABD534A280F}"/>
           </ac:spMkLst>
         </pc:spChg>
       </pc:sldChg>
@@ -353,9 +310,9 @@
           <a:bodyPr/>
           <a:lstStyle/>
           <a:p>
-            <a:fld id="{72DA9259-FA67-4F94-A1FA-19D3606B534F}" type="datetimeFigureOut">
+            <a:fld id="{2F49F8D7-1DC4-4BDB-B6FA-14C4DF2E1043}" type="datetimeFigureOut">
               <a:rPr lang="en-US" smtClean="0"/>
-              <a:t>10/15/2024</a:t>
+              <a:t>9/28/2024</a:t>
             </a:fld>
             <a:endParaRPr lang="en-US"/>
           </a:p>
@@ -395,7 +352,7 @@
           <a:bodyPr/>
           <a:lstStyle/>
           <a:p>
-            <a:fld id="{5B43E8E4-2917-43F7-B6E9-46BEDD52166E}" type="slidenum">
+            <a:fld id="{5D661ADA-AE8F-47E4-AB17-3C732F73DAF2}" type="slidenum">
               <a:rPr lang="en-US" smtClean="0"/>
               <a:t>‹#›</a:t>
             </a:fld>
@@ -406,7 +363,7 @@
     </p:spTree>
     <p:extLst>
       <p:ext uri="{BB962C8B-B14F-4D97-AF65-F5344CB8AC3E}">
-        <p14:creationId xmlns:p14="http://schemas.microsoft.com/office/powerpoint/2010/main" val="1764466146"/>
+        <p14:creationId xmlns:p14="http://schemas.microsoft.com/office/powerpoint/2010/main" val="3413093616"/>
       </p:ext>
     </p:extLst>
   </p:cSld>
@@ -523,9 +480,9 @@
           <a:bodyPr/>
           <a:lstStyle/>
           <a:p>
-            <a:fld id="{72DA9259-FA67-4F94-A1FA-19D3606B534F}" type="datetimeFigureOut">
+            <a:fld id="{2F49F8D7-1DC4-4BDB-B6FA-14C4DF2E1043}" type="datetimeFigureOut">
               <a:rPr lang="en-US" smtClean="0"/>
-              <a:t>10/15/2024</a:t>
+              <a:t>9/28/2024</a:t>
             </a:fld>
             <a:endParaRPr lang="en-US"/>
           </a:p>
@@ -565,7 +522,7 @@
           <a:bodyPr/>
           <a:lstStyle/>
           <a:p>
-            <a:fld id="{5B43E8E4-2917-43F7-B6E9-46BEDD52166E}" type="slidenum">
+            <a:fld id="{5D661ADA-AE8F-47E4-AB17-3C732F73DAF2}" type="slidenum">
               <a:rPr lang="en-US" smtClean="0"/>
               <a:t>‹#›</a:t>
             </a:fld>
@@ -576,7 +533,7 @@
     </p:spTree>
     <p:extLst>
       <p:ext uri="{BB962C8B-B14F-4D97-AF65-F5344CB8AC3E}">
-        <p14:creationId xmlns:p14="http://schemas.microsoft.com/office/powerpoint/2010/main" val="4133469253"/>
+        <p14:creationId xmlns:p14="http://schemas.microsoft.com/office/powerpoint/2010/main" val="2085318717"/>
       </p:ext>
     </p:extLst>
   </p:cSld>
@@ -703,9 +660,9 @@
           <a:bodyPr/>
           <a:lstStyle/>
           <a:p>
-            <a:fld id="{72DA9259-FA67-4F94-A1FA-19D3606B534F}" type="datetimeFigureOut">
+            <a:fld id="{2F49F8D7-1DC4-4BDB-B6FA-14C4DF2E1043}" type="datetimeFigureOut">
               <a:rPr lang="en-US" smtClean="0"/>
-              <a:t>10/15/2024</a:t>
+              <a:t>9/28/2024</a:t>
             </a:fld>
             <a:endParaRPr lang="en-US"/>
           </a:p>
@@ -745,7 +702,7 @@
           <a:bodyPr/>
           <a:lstStyle/>
           <a:p>
-            <a:fld id="{5B43E8E4-2917-43F7-B6E9-46BEDD52166E}" type="slidenum">
+            <a:fld id="{5D661ADA-AE8F-47E4-AB17-3C732F73DAF2}" type="slidenum">
               <a:rPr lang="en-US" smtClean="0"/>
               <a:t>‹#›</a:t>
             </a:fld>
@@ -756,7 +713,7 @@
     </p:spTree>
     <p:extLst>
       <p:ext uri="{BB962C8B-B14F-4D97-AF65-F5344CB8AC3E}">
-        <p14:creationId xmlns:p14="http://schemas.microsoft.com/office/powerpoint/2010/main" val="4047496680"/>
+        <p14:creationId xmlns:p14="http://schemas.microsoft.com/office/powerpoint/2010/main" val="2474382798"/>
       </p:ext>
     </p:extLst>
   </p:cSld>
@@ -873,9 +830,9 @@
           <a:bodyPr/>
           <a:lstStyle/>
           <a:p>
-            <a:fld id="{72DA9259-FA67-4F94-A1FA-19D3606B534F}" type="datetimeFigureOut">
+            <a:fld id="{2F49F8D7-1DC4-4BDB-B6FA-14C4DF2E1043}" type="datetimeFigureOut">
               <a:rPr lang="en-US" smtClean="0"/>
-              <a:t>10/15/2024</a:t>
+              <a:t>9/28/2024</a:t>
             </a:fld>
             <a:endParaRPr lang="en-US"/>
           </a:p>
@@ -915,7 +872,7 @@
           <a:bodyPr/>
           <a:lstStyle/>
           <a:p>
-            <a:fld id="{5B43E8E4-2917-43F7-B6E9-46BEDD52166E}" type="slidenum">
+            <a:fld id="{5D661ADA-AE8F-47E4-AB17-3C732F73DAF2}" type="slidenum">
               <a:rPr lang="en-US" smtClean="0"/>
               <a:t>‹#›</a:t>
             </a:fld>
@@ -926,7 +883,7 @@
     </p:spTree>
     <p:extLst>
       <p:ext uri="{BB962C8B-B14F-4D97-AF65-F5344CB8AC3E}">
-        <p14:creationId xmlns:p14="http://schemas.microsoft.com/office/powerpoint/2010/main" val="952882575"/>
+        <p14:creationId xmlns:p14="http://schemas.microsoft.com/office/powerpoint/2010/main" val="909882780"/>
       </p:ext>
     </p:extLst>
   </p:cSld>
@@ -1009,7 +966,7 @@
               <a:defRPr sz="2400">
                 <a:solidFill>
                   <a:schemeClr val="tx1">
-                    <a:shade val="82000"/>
+                    <a:tint val="75000"/>
                   </a:schemeClr>
                 </a:solidFill>
               </a:defRPr>
@@ -1019,7 +976,7 @@
               <a:defRPr sz="2000">
                 <a:solidFill>
                   <a:schemeClr val="tx1">
-                    <a:shade val="82000"/>
+                    <a:tint val="75000"/>
                   </a:schemeClr>
                 </a:solidFill>
               </a:defRPr>
@@ -1029,7 +986,7 @@
               <a:defRPr sz="1800">
                 <a:solidFill>
                   <a:schemeClr val="tx1">
-                    <a:shade val="82000"/>
+                    <a:tint val="75000"/>
                   </a:schemeClr>
                 </a:solidFill>
               </a:defRPr>
@@ -1039,7 +996,7 @@
               <a:defRPr sz="1600">
                 <a:solidFill>
                   <a:schemeClr val="tx1">
-                    <a:shade val="82000"/>
+                    <a:tint val="75000"/>
                   </a:schemeClr>
                 </a:solidFill>
               </a:defRPr>
@@ -1049,7 +1006,7 @@
               <a:defRPr sz="1600">
                 <a:solidFill>
                   <a:schemeClr val="tx1">
-                    <a:shade val="82000"/>
+                    <a:tint val="75000"/>
                   </a:schemeClr>
                 </a:solidFill>
               </a:defRPr>
@@ -1059,7 +1016,7 @@
               <a:defRPr sz="1600">
                 <a:solidFill>
                   <a:schemeClr val="tx1">
-                    <a:shade val="82000"/>
+                    <a:tint val="75000"/>
                   </a:schemeClr>
                 </a:solidFill>
               </a:defRPr>
@@ -1069,7 +1026,7 @@
               <a:defRPr sz="1600">
                 <a:solidFill>
                   <a:schemeClr val="tx1">
-                    <a:shade val="82000"/>
+                    <a:tint val="75000"/>
                   </a:schemeClr>
                 </a:solidFill>
               </a:defRPr>
@@ -1079,7 +1036,7 @@
               <a:defRPr sz="1600">
                 <a:solidFill>
                   <a:schemeClr val="tx1">
-                    <a:shade val="82000"/>
+                    <a:tint val="75000"/>
                   </a:schemeClr>
                 </a:solidFill>
               </a:defRPr>
@@ -1089,7 +1046,7 @@
               <a:defRPr sz="1600">
                 <a:solidFill>
                   <a:schemeClr val="tx1">
-                    <a:shade val="82000"/>
+                    <a:tint val="75000"/>
                   </a:schemeClr>
                 </a:solidFill>
               </a:defRPr>
@@ -1119,9 +1076,9 @@
           <a:bodyPr/>
           <a:lstStyle/>
           <a:p>
-            <a:fld id="{72DA9259-FA67-4F94-A1FA-19D3606B534F}" type="datetimeFigureOut">
+            <a:fld id="{2F49F8D7-1DC4-4BDB-B6FA-14C4DF2E1043}" type="datetimeFigureOut">
               <a:rPr lang="en-US" smtClean="0"/>
-              <a:t>10/15/2024</a:t>
+              <a:t>9/28/2024</a:t>
             </a:fld>
             <a:endParaRPr lang="en-US"/>
           </a:p>
@@ -1161,7 +1118,7 @@
           <a:bodyPr/>
           <a:lstStyle/>
           <a:p>
-            <a:fld id="{5B43E8E4-2917-43F7-B6E9-46BEDD52166E}" type="slidenum">
+            <a:fld id="{5D661ADA-AE8F-47E4-AB17-3C732F73DAF2}" type="slidenum">
               <a:rPr lang="en-US" smtClean="0"/>
               <a:t>‹#›</a:t>
             </a:fld>
@@ -1172,7 +1129,7 @@
     </p:spTree>
     <p:extLst>
       <p:ext uri="{BB962C8B-B14F-4D97-AF65-F5344CB8AC3E}">
-        <p14:creationId xmlns:p14="http://schemas.microsoft.com/office/powerpoint/2010/main" val="1884960466"/>
+        <p14:creationId xmlns:p14="http://schemas.microsoft.com/office/powerpoint/2010/main" val="1402349965"/>
       </p:ext>
     </p:extLst>
   </p:cSld>
@@ -1351,9 +1308,9 @@
           <a:bodyPr/>
           <a:lstStyle/>
           <a:p>
-            <a:fld id="{72DA9259-FA67-4F94-A1FA-19D3606B534F}" type="datetimeFigureOut">
+            <a:fld id="{2F49F8D7-1DC4-4BDB-B6FA-14C4DF2E1043}" type="datetimeFigureOut">
               <a:rPr lang="en-US" smtClean="0"/>
-              <a:t>10/15/2024</a:t>
+              <a:t>9/28/2024</a:t>
             </a:fld>
             <a:endParaRPr lang="en-US"/>
           </a:p>
@@ -1393,7 +1350,7 @@
           <a:bodyPr/>
           <a:lstStyle/>
           <a:p>
-            <a:fld id="{5B43E8E4-2917-43F7-B6E9-46BEDD52166E}" type="slidenum">
+            <a:fld id="{5D661ADA-AE8F-47E4-AB17-3C732F73DAF2}" type="slidenum">
               <a:rPr lang="en-US" smtClean="0"/>
               <a:t>‹#›</a:t>
             </a:fld>
@@ -1404,7 +1361,7 @@
     </p:spTree>
     <p:extLst>
       <p:ext uri="{BB962C8B-B14F-4D97-AF65-F5344CB8AC3E}">
-        <p14:creationId xmlns:p14="http://schemas.microsoft.com/office/powerpoint/2010/main" val="2781537681"/>
+        <p14:creationId xmlns:p14="http://schemas.microsoft.com/office/powerpoint/2010/main" val="3365561557"/>
       </p:ext>
     </p:extLst>
   </p:cSld>
@@ -1718,9 +1675,9 @@
           <a:bodyPr/>
           <a:lstStyle/>
           <a:p>
-            <a:fld id="{72DA9259-FA67-4F94-A1FA-19D3606B534F}" type="datetimeFigureOut">
+            <a:fld id="{2F49F8D7-1DC4-4BDB-B6FA-14C4DF2E1043}" type="datetimeFigureOut">
               <a:rPr lang="en-US" smtClean="0"/>
-              <a:t>10/15/2024</a:t>
+              <a:t>9/28/2024</a:t>
             </a:fld>
             <a:endParaRPr lang="en-US"/>
           </a:p>
@@ -1760,7 +1717,7 @@
           <a:bodyPr/>
           <a:lstStyle/>
           <a:p>
-            <a:fld id="{5B43E8E4-2917-43F7-B6E9-46BEDD52166E}" type="slidenum">
+            <a:fld id="{5D661ADA-AE8F-47E4-AB17-3C732F73DAF2}" type="slidenum">
               <a:rPr lang="en-US" smtClean="0"/>
               <a:t>‹#›</a:t>
             </a:fld>
@@ -1771,7 +1728,7 @@
     </p:spTree>
     <p:extLst>
       <p:ext uri="{BB962C8B-B14F-4D97-AF65-F5344CB8AC3E}">
-        <p14:creationId xmlns:p14="http://schemas.microsoft.com/office/powerpoint/2010/main" val="2729265803"/>
+        <p14:creationId xmlns:p14="http://schemas.microsoft.com/office/powerpoint/2010/main" val="1874457318"/>
       </p:ext>
     </p:extLst>
   </p:cSld>
@@ -1836,9 +1793,9 @@
           <a:bodyPr/>
           <a:lstStyle/>
           <a:p>
-            <a:fld id="{72DA9259-FA67-4F94-A1FA-19D3606B534F}" type="datetimeFigureOut">
+            <a:fld id="{2F49F8D7-1DC4-4BDB-B6FA-14C4DF2E1043}" type="datetimeFigureOut">
               <a:rPr lang="en-US" smtClean="0"/>
-              <a:t>10/15/2024</a:t>
+              <a:t>9/28/2024</a:t>
             </a:fld>
             <a:endParaRPr lang="en-US"/>
           </a:p>
@@ -1878,7 +1835,7 @@
           <a:bodyPr/>
           <a:lstStyle/>
           <a:p>
-            <a:fld id="{5B43E8E4-2917-43F7-B6E9-46BEDD52166E}" type="slidenum">
+            <a:fld id="{5D661ADA-AE8F-47E4-AB17-3C732F73DAF2}" type="slidenum">
               <a:rPr lang="en-US" smtClean="0"/>
               <a:t>‹#›</a:t>
             </a:fld>
@@ -1889,7 +1846,7 @@
     </p:spTree>
     <p:extLst>
       <p:ext uri="{BB962C8B-B14F-4D97-AF65-F5344CB8AC3E}">
-        <p14:creationId xmlns:p14="http://schemas.microsoft.com/office/powerpoint/2010/main" val="1503131487"/>
+        <p14:creationId xmlns:p14="http://schemas.microsoft.com/office/powerpoint/2010/main" val="2394301081"/>
       </p:ext>
     </p:extLst>
   </p:cSld>
@@ -1931,9 +1888,9 @@
           <a:bodyPr/>
           <a:lstStyle/>
           <a:p>
-            <a:fld id="{72DA9259-FA67-4F94-A1FA-19D3606B534F}" type="datetimeFigureOut">
+            <a:fld id="{2F49F8D7-1DC4-4BDB-B6FA-14C4DF2E1043}" type="datetimeFigureOut">
               <a:rPr lang="en-US" smtClean="0"/>
-              <a:t>10/15/2024</a:t>
+              <a:t>9/28/2024</a:t>
             </a:fld>
             <a:endParaRPr lang="en-US"/>
           </a:p>
@@ -1973,7 +1930,7 @@
           <a:bodyPr/>
           <a:lstStyle/>
           <a:p>
-            <a:fld id="{5B43E8E4-2917-43F7-B6E9-46BEDD52166E}" type="slidenum">
+            <a:fld id="{5D661ADA-AE8F-47E4-AB17-3C732F73DAF2}" type="slidenum">
               <a:rPr lang="en-US" smtClean="0"/>
               <a:t>‹#›</a:t>
             </a:fld>
@@ -1984,7 +1941,7 @@
     </p:spTree>
     <p:extLst>
       <p:ext uri="{BB962C8B-B14F-4D97-AF65-F5344CB8AC3E}">
-        <p14:creationId xmlns:p14="http://schemas.microsoft.com/office/powerpoint/2010/main" val="2242397941"/>
+        <p14:creationId xmlns:p14="http://schemas.microsoft.com/office/powerpoint/2010/main" val="1288089909"/>
       </p:ext>
     </p:extLst>
   </p:cSld>
@@ -2208,9 +2165,9 @@
           <a:bodyPr/>
           <a:lstStyle/>
           <a:p>
-            <a:fld id="{72DA9259-FA67-4F94-A1FA-19D3606B534F}" type="datetimeFigureOut">
+            <a:fld id="{2F49F8D7-1DC4-4BDB-B6FA-14C4DF2E1043}" type="datetimeFigureOut">
               <a:rPr lang="en-US" smtClean="0"/>
-              <a:t>10/15/2024</a:t>
+              <a:t>9/28/2024</a:t>
             </a:fld>
             <a:endParaRPr lang="en-US"/>
           </a:p>
@@ -2250,7 +2207,7 @@
           <a:bodyPr/>
           <a:lstStyle/>
           <a:p>
-            <a:fld id="{5B43E8E4-2917-43F7-B6E9-46BEDD52166E}" type="slidenum">
+            <a:fld id="{5D661ADA-AE8F-47E4-AB17-3C732F73DAF2}" type="slidenum">
               <a:rPr lang="en-US" smtClean="0"/>
               <a:t>‹#›</a:t>
             </a:fld>
@@ -2261,7 +2218,7 @@
     </p:spTree>
     <p:extLst>
       <p:ext uri="{BB962C8B-B14F-4D97-AF65-F5344CB8AC3E}">
-        <p14:creationId xmlns:p14="http://schemas.microsoft.com/office/powerpoint/2010/main" val="4161339414"/>
+        <p14:creationId xmlns:p14="http://schemas.microsoft.com/office/powerpoint/2010/main" val="4044588762"/>
       </p:ext>
     </p:extLst>
   </p:cSld>
@@ -2465,9 +2422,9 @@
           <a:bodyPr/>
           <a:lstStyle/>
           <a:p>
-            <a:fld id="{72DA9259-FA67-4F94-A1FA-19D3606B534F}" type="datetimeFigureOut">
+            <a:fld id="{2F49F8D7-1DC4-4BDB-B6FA-14C4DF2E1043}" type="datetimeFigureOut">
               <a:rPr lang="en-US" smtClean="0"/>
-              <a:t>10/15/2024</a:t>
+              <a:t>9/28/2024</a:t>
             </a:fld>
             <a:endParaRPr lang="en-US"/>
           </a:p>
@@ -2507,7 +2464,7 @@
           <a:bodyPr/>
           <a:lstStyle/>
           <a:p>
-            <a:fld id="{5B43E8E4-2917-43F7-B6E9-46BEDD52166E}" type="slidenum">
+            <a:fld id="{5D661ADA-AE8F-47E4-AB17-3C732F73DAF2}" type="slidenum">
               <a:rPr lang="en-US" smtClean="0"/>
               <a:t>‹#›</a:t>
             </a:fld>
@@ -2518,7 +2475,7 @@
     </p:spTree>
     <p:extLst>
       <p:ext uri="{BB962C8B-B14F-4D97-AF65-F5344CB8AC3E}">
-        <p14:creationId xmlns:p14="http://schemas.microsoft.com/office/powerpoint/2010/main" val="3670061854"/>
+        <p14:creationId xmlns:p14="http://schemas.microsoft.com/office/powerpoint/2010/main" val="1198144989"/>
       </p:ext>
     </p:extLst>
   </p:cSld>
@@ -2671,16 +2628,16 @@
               <a:defRPr sz="1200">
                 <a:solidFill>
                   <a:schemeClr val="tx1">
-                    <a:shade val="82000"/>
+                    <a:tint val="75000"/>
                   </a:schemeClr>
                 </a:solidFill>
               </a:defRPr>
             </a:lvl1pPr>
           </a:lstStyle>
           <a:p>
-            <a:fld id="{72DA9259-FA67-4F94-A1FA-19D3606B534F}" type="datetimeFigureOut">
+            <a:fld id="{2F49F8D7-1DC4-4BDB-B6FA-14C4DF2E1043}" type="datetimeFigureOut">
               <a:rPr lang="en-US" smtClean="0"/>
-              <a:t>10/15/2024</a:t>
+              <a:t>9/28/2024</a:t>
             </a:fld>
             <a:endParaRPr lang="en-US"/>
           </a:p>
@@ -2712,7 +2669,7 @@
               <a:defRPr sz="1200">
                 <a:solidFill>
                   <a:schemeClr val="tx1">
-                    <a:shade val="82000"/>
+                    <a:tint val="75000"/>
                   </a:schemeClr>
                 </a:solidFill>
               </a:defRPr>
@@ -2749,14 +2706,14 @@
               <a:defRPr sz="1200">
                 <a:solidFill>
                   <a:schemeClr val="tx1">
-                    <a:shade val="82000"/>
+                    <a:tint val="75000"/>
                   </a:schemeClr>
                 </a:solidFill>
               </a:defRPr>
             </a:lvl1pPr>
           </a:lstStyle>
           <a:p>
-            <a:fld id="{5B43E8E4-2917-43F7-B6E9-46BEDD52166E}" type="slidenum">
+            <a:fld id="{5D661ADA-AE8F-47E4-AB17-3C732F73DAF2}" type="slidenum">
               <a:rPr lang="en-US" smtClean="0"/>
               <a:t>‹#›</a:t>
             </a:fld>
@@ -2767,7 +2724,7 @@
     </p:spTree>
     <p:extLst>
       <p:ext uri="{BB962C8B-B14F-4D97-AF65-F5344CB8AC3E}">
-        <p14:creationId xmlns:p14="http://schemas.microsoft.com/office/powerpoint/2010/main" val="985940737"/>
+        <p14:creationId xmlns:p14="http://schemas.microsoft.com/office/powerpoint/2010/main" val="2276541113"/>
       </p:ext>
     </p:extLst>
   </p:cSld>
@@ -3073,7 +3030,13 @@
   <p:cSld>
     <p:spTree>
       <p:nvGrpSpPr>
-        <p:cNvPr id="1" name=""/>
+        <p:cNvPr id="1" name="">
+          <a:extLst>
+            <a:ext uri="{FF2B5EF4-FFF2-40B4-BE49-F238E27FC236}">
+              <a16:creationId xmlns:a16="http://schemas.microsoft.com/office/drawing/2014/main" id="{9810B86F-248C-A935-C6DF-62153682207E}"/>
+            </a:ext>
+          </a:extLst>
+        </p:cNvPr>
         <p:cNvGrpSpPr/>
         <p:nvPr/>
       </p:nvGrpSpPr>
@@ -3087,10 +3050,10 @@
       </p:grpSpPr>
       <p:sp>
         <p:nvSpPr>
-          <p:cNvPr id="2" name="Title 1">
+          <p:cNvPr id="3" name="Subtitle 2">
             <a:extLst>
               <a:ext uri="{FF2B5EF4-FFF2-40B4-BE49-F238E27FC236}">
-                <a16:creationId xmlns:a16="http://schemas.microsoft.com/office/drawing/2014/main" id="{BFDA464E-37E7-7D61-6E99-ACD35979E289}"/>
+                <a16:creationId xmlns:a16="http://schemas.microsoft.com/office/drawing/2014/main" id="{E393FEF4-64A2-3209-71C7-85DC3AAB6E7F}"/>
               </a:ext>
             </a:extLst>
           </p:cNvPr>
@@ -3098,52 +3061,97 @@
             <a:spLocks noGrp="1"/>
           </p:cNvSpPr>
           <p:nvPr>
-            <p:ph type="ctrTitle"/>
+            <p:ph type="subTitle" idx="1"/>
           </p:nvPr>
         </p:nvSpPr>
         <p:spPr>
           <a:xfrm>
-            <a:off x="0" y="0"/>
-            <a:ext cx="12192000" cy="6858000"/>
+            <a:off x="0" y="-265043"/>
+            <a:ext cx="12192000" cy="7123043"/>
           </a:xfrm>
         </p:spPr>
         <p:txBody>
-          <a:bodyPr anchor="ctr"/>
-          <a:lstStyle/>
-          <a:p>
-            <a:r>
-              <a:rPr lang="ru-RU" dirty="0"/>
-              <a:t>Мне есть за что благодарить Творца</a:t>
-            </a:r>
-            <a:br>
-              <a:rPr lang="ru-RU" dirty="0"/>
-            </a:br>
-            <a:r>
-              <a:rPr lang="ru-RU" dirty="0"/>
-              <a:t>Он снял с меня греховную проказу</a:t>
-            </a:r>
-            <a:br>
-              <a:rPr lang="ru-RU" dirty="0"/>
-            </a:br>
-            <a:r>
-              <a:rPr lang="ru-RU" dirty="0"/>
-              <a:t>О пусть теперь польется без конца</a:t>
-            </a:r>
-            <a:br>
-              <a:rPr lang="ru-RU" dirty="0"/>
-            </a:br>
-            <a:r>
-              <a:rPr lang="ru-RU" dirty="0"/>
-              <a:t>Хвала ему в поэмах и рассказах</a:t>
-            </a:r>
-            <a:endParaRPr lang="en-US" dirty="0"/>
+          <a:bodyPr vert="horz" lIns="91440" tIns="45720" rIns="91440" bIns="45720" rtlCol="0" anchor="t">
+            <a:noAutofit/>
+          </a:bodyPr>
+          <a:lstStyle/>
+          <a:p>
+            <a:endParaRPr lang="ru-RU" sz="5400" dirty="0"/>
+          </a:p>
+          <a:p>
+            <a:r>
+              <a:rPr lang="ru-RU" sz="5400" dirty="0">
+                <a:latin typeface="Times New Roman"/>
+                <a:cs typeface="Times New Roman"/>
+              </a:rPr>
+              <a:t>Господь есть мой свет, </a:t>
+            </a:r>
+          </a:p>
+          <a:p>
+            <a:r>
+              <a:rPr lang="ru-RU" sz="5400" dirty="0">
+                <a:latin typeface="Times New Roman"/>
+                <a:cs typeface="Times New Roman"/>
+              </a:rPr>
+              <a:t>Он мой свет, Спаситель мой, </a:t>
+            </a:r>
+          </a:p>
+          <a:p>
+            <a:r>
+              <a:rPr lang="ru-RU" sz="5400">
+                <a:latin typeface="Times New Roman"/>
+                <a:cs typeface="Times New Roman"/>
+              </a:rPr>
+              <a:t>я не страшусь. </a:t>
+            </a:r>
+          </a:p>
+          <a:p>
+            <a:r>
+              <a:rPr lang="ru-RU" sz="5400" dirty="0">
+                <a:latin typeface="Times New Roman"/>
+                <a:cs typeface="Times New Roman"/>
+              </a:rPr>
+              <a:t>Господь мой есть крепость </a:t>
+            </a:r>
+          </a:p>
+          <a:p>
+            <a:r>
+              <a:rPr lang="ru-RU" sz="5400" dirty="0">
+                <a:latin typeface="Times New Roman"/>
+                <a:cs typeface="Times New Roman"/>
+              </a:rPr>
+              <a:t>для жизни моей, </a:t>
+            </a:r>
+          </a:p>
+          <a:p>
+            <a:r>
+              <a:rPr lang="ru-RU" sz="5400" dirty="0">
+                <a:latin typeface="Times New Roman"/>
+                <a:cs typeface="Times New Roman"/>
+              </a:rPr>
+              <a:t>кого </a:t>
+            </a:r>
+            <a:r>
+              <a:rPr lang="ru-RU" sz="5400" dirty="0" err="1">
+                <a:latin typeface="Times New Roman"/>
+                <a:cs typeface="Times New Roman"/>
+              </a:rPr>
+              <a:t>убоюся</a:t>
+            </a:r>
+            <a:r>
+              <a:rPr lang="ru-RU" sz="5400" dirty="0">
+                <a:latin typeface="Times New Roman"/>
+                <a:cs typeface="Times New Roman"/>
+              </a:rPr>
+              <a:t> я? </a:t>
+            </a:r>
           </a:p>
         </p:txBody>
       </p:sp>
     </p:spTree>
     <p:extLst>
       <p:ext uri="{BB962C8B-B14F-4D97-AF65-F5344CB8AC3E}">
-        <p14:creationId xmlns:p14="http://schemas.microsoft.com/office/powerpoint/2010/main" val="1889788063"/>
+        <p14:creationId xmlns:p14="http://schemas.microsoft.com/office/powerpoint/2010/main" val="1794953803"/>
       </p:ext>
     </p:extLst>
   </p:cSld>
@@ -3172,10 +3180,10 @@
       </p:grpSpPr>
       <p:sp>
         <p:nvSpPr>
-          <p:cNvPr id="2" name="Title 1">
+          <p:cNvPr id="3" name="Subtitle 2">
             <a:extLst>
               <a:ext uri="{FF2B5EF4-FFF2-40B4-BE49-F238E27FC236}">
-                <a16:creationId xmlns:a16="http://schemas.microsoft.com/office/drawing/2014/main" id="{BFDA464E-37E7-7D61-6E99-ACD35979E289}"/>
+                <a16:creationId xmlns:a16="http://schemas.microsoft.com/office/drawing/2014/main" id="{72DF2D19-D144-D52E-6A2C-B42F3297DCF3}"/>
               </a:ext>
             </a:extLst>
           </p:cNvPr>
@@ -3183,7 +3191,7 @@
             <a:spLocks noGrp="1"/>
           </p:cNvSpPr>
           <p:nvPr>
-            <p:ph type="ctrTitle"/>
+            <p:ph type="subTitle" idx="1"/>
           </p:nvPr>
         </p:nvSpPr>
         <p:spPr>
@@ -3193,42 +3201,75 @@
           </a:xfrm>
         </p:spPr>
         <p:txBody>
-          <a:bodyPr anchor="ctr"/>
-          <a:lstStyle/>
-          <a:p>
-            <a:r>
-              <a:rPr lang="ru-RU" dirty="0"/>
-              <a:t>Вот почему мне хочется любить</a:t>
-            </a:r>
-            <a:br>
-              <a:rPr lang="ru-RU" dirty="0"/>
-            </a:br>
-            <a:r>
-              <a:rPr lang="ru-RU" dirty="0"/>
-              <a:t>Его сильней, и искренней, и чище</a:t>
-            </a:r>
-            <a:br>
-              <a:rPr lang="ru-RU" dirty="0"/>
-            </a:br>
-            <a:r>
-              <a:rPr lang="ru-RU" dirty="0"/>
-              <a:t>Мне есть за что Христа благодарить</a:t>
-            </a:r>
-            <a:br>
-              <a:rPr lang="ru-RU" dirty="0"/>
-            </a:br>
-            <a:r>
-              <a:rPr lang="ru-RU" dirty="0"/>
-              <a:t>Он мне купил небесное жилище</a:t>
-            </a:r>
-            <a:endParaRPr lang="en-US" dirty="0"/>
+          <a:bodyPr vert="horz" lIns="91440" tIns="45720" rIns="91440" bIns="45720" rtlCol="0" anchor="t">
+            <a:noAutofit/>
+          </a:bodyPr>
+          <a:lstStyle/>
+          <a:p>
+            <a:endParaRPr lang="ru-RU" sz="5400" dirty="0"/>
+          </a:p>
+          <a:p>
+            <a:r>
+              <a:rPr lang="ru-RU" sz="5400" dirty="0">
+                <a:latin typeface="Times New Roman"/>
+                <a:cs typeface="Times New Roman"/>
+              </a:rPr>
+              <a:t>Войско ли нечестивых близко, </a:t>
+            </a:r>
+          </a:p>
+          <a:p>
+            <a:r>
+              <a:rPr lang="ru-RU" sz="5400" dirty="0">
+                <a:latin typeface="Times New Roman"/>
+                <a:cs typeface="Times New Roman"/>
+              </a:rPr>
+              <a:t>и я не страшусь.</a:t>
+            </a:r>
+          </a:p>
+          <a:p>
+            <a:r>
+              <a:rPr lang="ru-RU" sz="5400" dirty="0">
+                <a:latin typeface="Times New Roman"/>
+                <a:cs typeface="Times New Roman"/>
+              </a:rPr>
+              <a:t>Грозит ли враг войною, </a:t>
+            </a:r>
+          </a:p>
+          <a:p>
+            <a:r>
+              <a:rPr lang="ru-RU" sz="5400" dirty="0">
+                <a:latin typeface="Times New Roman"/>
+                <a:cs typeface="Times New Roman"/>
+              </a:rPr>
+              <a:t>на Бога надеюсь я. </a:t>
+            </a:r>
+          </a:p>
+          <a:p>
+            <a:r>
+              <a:rPr lang="ru-RU" sz="5400" dirty="0">
+                <a:latin typeface="Times New Roman"/>
+                <a:cs typeface="Times New Roman"/>
+              </a:rPr>
+              <a:t>Я одного лишь жду от Творца, </a:t>
+            </a:r>
+            <a:endParaRPr lang="ru-RU" dirty="0"/>
+          </a:p>
+          <a:p>
+            <a:r>
+              <a:rPr lang="ru-RU" sz="5400" dirty="0">
+                <a:latin typeface="Times New Roman"/>
+                <a:cs typeface="Times New Roman"/>
+              </a:rPr>
+              <a:t>одного я жду: </a:t>
+            </a:r>
+            <a:endParaRPr lang="ru-RU"/>
           </a:p>
         </p:txBody>
       </p:sp>
     </p:spTree>
     <p:extLst>
       <p:ext uri="{BB962C8B-B14F-4D97-AF65-F5344CB8AC3E}">
-        <p14:creationId xmlns:p14="http://schemas.microsoft.com/office/powerpoint/2010/main" val="3350942817"/>
+        <p14:creationId xmlns:p14="http://schemas.microsoft.com/office/powerpoint/2010/main" val="1741310931"/>
       </p:ext>
     </p:extLst>
   </p:cSld>
@@ -3243,7 +3284,13 @@
   <p:cSld>
     <p:spTree>
       <p:nvGrpSpPr>
-        <p:cNvPr id="1" name=""/>
+        <p:cNvPr id="1" name="">
+          <a:extLst>
+            <a:ext uri="{FF2B5EF4-FFF2-40B4-BE49-F238E27FC236}">
+              <a16:creationId xmlns:a16="http://schemas.microsoft.com/office/drawing/2014/main" id="{05275A52-252B-C0CA-0547-205CF296A3CA}"/>
+            </a:ext>
+          </a:extLst>
+        </p:cNvPr>
         <p:cNvGrpSpPr/>
         <p:nvPr/>
       </p:nvGrpSpPr>
@@ -3257,10 +3304,10 @@
       </p:grpSpPr>
       <p:sp>
         <p:nvSpPr>
-          <p:cNvPr id="2" name="Title 1">
+          <p:cNvPr id="3" name="Subtitle 2">
             <a:extLst>
               <a:ext uri="{FF2B5EF4-FFF2-40B4-BE49-F238E27FC236}">
-                <a16:creationId xmlns:a16="http://schemas.microsoft.com/office/drawing/2014/main" id="{BFDA464E-37E7-7D61-6E99-ACD35979E289}"/>
+                <a16:creationId xmlns:a16="http://schemas.microsoft.com/office/drawing/2014/main" id="{55CD1044-1DE7-DF1E-8B2E-9ABD534A280F}"/>
               </a:ext>
             </a:extLst>
           </p:cNvPr>
@@ -3268,7 +3315,7 @@
             <a:spLocks noGrp="1"/>
           </p:cNvSpPr>
           <p:nvPr>
-            <p:ph type="ctrTitle"/>
+            <p:ph type="subTitle" idx="1"/>
           </p:nvPr>
         </p:nvSpPr>
         <p:spPr>
@@ -3278,308 +3325,78 @@
           </a:xfrm>
         </p:spPr>
         <p:txBody>
-          <a:bodyPr anchor="ctr"/>
-          <a:lstStyle/>
-          <a:p>
-            <a:r>
-              <a:rPr lang="ru-RU" dirty="0"/>
-              <a:t>Душа взывать к Христу не устает</a:t>
-            </a:r>
-            <a:br>
-              <a:rPr lang="ru-RU" dirty="0"/>
-            </a:br>
-            <a:r>
-              <a:rPr lang="ru-RU" dirty="0"/>
-              <a:t>Где падала – прощения просила</a:t>
-            </a:r>
-            <a:br>
-              <a:rPr lang="ru-RU" dirty="0"/>
-            </a:br>
-            <a:r>
-              <a:rPr lang="ru-RU" dirty="0"/>
-              <a:t>Ведь Он в беде мне руку подает</a:t>
-            </a:r>
-            <a:br>
-              <a:rPr lang="ru-RU" dirty="0"/>
-            </a:br>
-            <a:r>
-              <a:rPr lang="ru-RU" dirty="0"/>
-              <a:t>Ведь Он один – прибежище и сила</a:t>
-            </a:r>
-            <a:endParaRPr lang="en-US" dirty="0"/>
+          <a:bodyPr vert="horz" lIns="91440" tIns="45720" rIns="91440" bIns="45720" rtlCol="0" anchor="t">
+            <a:noAutofit/>
+          </a:bodyPr>
+          <a:lstStyle/>
+          <a:p>
+            <a:endParaRPr lang="ru-RU" sz="2800" dirty="0">
+              <a:ea typeface="Calibri"/>
+              <a:cs typeface="Calibri"/>
+            </a:endParaRPr>
+          </a:p>
+          <a:p>
+            <a:endParaRPr lang="ru-RU" sz="5400" dirty="0">
+              <a:latin typeface="Calibri" panose="020F0502020204030204"/>
+              <a:ea typeface="Calibri" panose="020F0502020204030204"/>
+              <a:cs typeface="Calibri" panose="020F0502020204030204"/>
+            </a:endParaRPr>
+          </a:p>
+          <a:p>
+            <a:r>
+              <a:rPr lang="ru-RU" sz="5400" dirty="0">
+                <a:latin typeface="Times New Roman"/>
+                <a:cs typeface="Times New Roman"/>
+              </a:rPr>
+              <a:t>Чтоб в доме Божьем </a:t>
+            </a:r>
+          </a:p>
+          <a:p>
+            <a:r>
+              <a:rPr lang="ru-RU" sz="5400" dirty="0">
+                <a:latin typeface="Times New Roman"/>
+                <a:cs typeface="Times New Roman"/>
+              </a:rPr>
+              <a:t>я мог пребывать </a:t>
+            </a:r>
+          </a:p>
+          <a:p>
+            <a:r>
+              <a:rPr lang="ru-RU" sz="5400" dirty="0">
+                <a:latin typeface="Times New Roman"/>
+                <a:cs typeface="Times New Roman"/>
+              </a:rPr>
+              <a:t>навсегда,</a:t>
+            </a:r>
+          </a:p>
+          <a:p>
+            <a:r>
+              <a:rPr lang="ru-RU" sz="5400" dirty="0">
+                <a:latin typeface="Times New Roman"/>
+                <a:cs typeface="Times New Roman"/>
+              </a:rPr>
+              <a:t>Аминь.</a:t>
+            </a:r>
+            <a:endParaRPr lang="en-US" sz="5400">
+              <a:latin typeface="Times New Roman"/>
+              <a:cs typeface="Times New Roman"/>
+            </a:endParaRPr>
+          </a:p>
+          <a:p>
+            <a:r>
+              <a:rPr lang="ru-RU" sz="5400" dirty="0">
+                <a:latin typeface="Times New Roman"/>
+                <a:cs typeface="Times New Roman"/>
+              </a:rPr>
+              <a:t>* * *</a:t>
+            </a:r>
           </a:p>
         </p:txBody>
       </p:sp>
     </p:spTree>
     <p:extLst>
       <p:ext uri="{BB962C8B-B14F-4D97-AF65-F5344CB8AC3E}">
-        <p14:creationId xmlns:p14="http://schemas.microsoft.com/office/powerpoint/2010/main" val="292070290"/>
-      </p:ext>
-    </p:extLst>
-  </p:cSld>
-  <p:clrMapOvr>
-    <a:masterClrMapping/>
-  </p:clrMapOvr>
-</p:sld>
-</file>
-
-<file path=ppt/slides/slide4.xml><?xml version="1.0" encoding="utf-8"?>
-<p:sld xmlns:a="http://schemas.openxmlformats.org/drawingml/2006/main" xmlns:r="http://schemas.openxmlformats.org/officeDocument/2006/relationships" xmlns:p="http://schemas.openxmlformats.org/presentationml/2006/main">
-  <p:cSld>
-    <p:spTree>
-      <p:nvGrpSpPr>
-        <p:cNvPr id="1" name=""/>
-        <p:cNvGrpSpPr/>
-        <p:nvPr/>
-      </p:nvGrpSpPr>
-      <p:grpSpPr>
-        <a:xfrm>
-          <a:off x="0" y="0"/>
-          <a:ext cx="0" cy="0"/>
-          <a:chOff x="0" y="0"/>
-          <a:chExt cx="0" cy="0"/>
-        </a:xfrm>
-      </p:grpSpPr>
-      <p:sp>
-        <p:nvSpPr>
-          <p:cNvPr id="2" name="Title 1">
-            <a:extLst>
-              <a:ext uri="{FF2B5EF4-FFF2-40B4-BE49-F238E27FC236}">
-                <a16:creationId xmlns:a16="http://schemas.microsoft.com/office/drawing/2014/main" id="{BFDA464E-37E7-7D61-6E99-ACD35979E289}"/>
-              </a:ext>
-            </a:extLst>
-          </p:cNvPr>
-          <p:cNvSpPr>
-            <a:spLocks noGrp="1"/>
-          </p:cNvSpPr>
-          <p:nvPr>
-            <p:ph type="ctrTitle"/>
-          </p:nvPr>
-        </p:nvSpPr>
-        <p:spPr>
-          <a:xfrm>
-            <a:off x="0" y="0"/>
-            <a:ext cx="12192000" cy="6858000"/>
-          </a:xfrm>
-        </p:spPr>
-        <p:txBody>
-          <a:bodyPr anchor="ctr"/>
-          <a:lstStyle/>
-          <a:p>
-            <a:r>
-              <a:rPr lang="ru-RU" dirty="0"/>
-              <a:t>Вот почему мне хочется любить</a:t>
-            </a:r>
-            <a:br>
-              <a:rPr lang="ru-RU" dirty="0"/>
-            </a:br>
-            <a:r>
-              <a:rPr lang="ru-RU" dirty="0"/>
-              <a:t>Его сильней, и искренней, и чище</a:t>
-            </a:r>
-            <a:br>
-              <a:rPr lang="ru-RU" dirty="0"/>
-            </a:br>
-            <a:r>
-              <a:rPr lang="ru-RU" dirty="0"/>
-              <a:t>Мне есть за что Христа благодарить</a:t>
-            </a:r>
-            <a:br>
-              <a:rPr lang="ru-RU" dirty="0"/>
-            </a:br>
-            <a:r>
-              <a:rPr lang="ru-RU" dirty="0"/>
-              <a:t>Он мне купил небесное жилище</a:t>
-            </a:r>
-            <a:endParaRPr lang="en-US" dirty="0"/>
-          </a:p>
-        </p:txBody>
-      </p:sp>
-    </p:spTree>
-    <p:extLst>
-      <p:ext uri="{BB962C8B-B14F-4D97-AF65-F5344CB8AC3E}">
-        <p14:creationId xmlns:p14="http://schemas.microsoft.com/office/powerpoint/2010/main" val="3863399069"/>
-      </p:ext>
-    </p:extLst>
-  </p:cSld>
-  <p:clrMapOvr>
-    <a:masterClrMapping/>
-  </p:clrMapOvr>
-</p:sld>
-</file>
-
-<file path=ppt/slides/slide5.xml><?xml version="1.0" encoding="utf-8"?>
-<p:sld xmlns:a="http://schemas.openxmlformats.org/drawingml/2006/main" xmlns:r="http://schemas.openxmlformats.org/officeDocument/2006/relationships" xmlns:p="http://schemas.openxmlformats.org/presentationml/2006/main">
-  <p:cSld>
-    <p:spTree>
-      <p:nvGrpSpPr>
-        <p:cNvPr id="1" name=""/>
-        <p:cNvGrpSpPr/>
-        <p:nvPr/>
-      </p:nvGrpSpPr>
-      <p:grpSpPr>
-        <a:xfrm>
-          <a:off x="0" y="0"/>
-          <a:ext cx="0" cy="0"/>
-          <a:chOff x="0" y="0"/>
-          <a:chExt cx="0" cy="0"/>
-        </a:xfrm>
-      </p:grpSpPr>
-      <p:sp>
-        <p:nvSpPr>
-          <p:cNvPr id="2" name="Title 1">
-            <a:extLst>
-              <a:ext uri="{FF2B5EF4-FFF2-40B4-BE49-F238E27FC236}">
-                <a16:creationId xmlns:a16="http://schemas.microsoft.com/office/drawing/2014/main" id="{BFDA464E-37E7-7D61-6E99-ACD35979E289}"/>
-              </a:ext>
-            </a:extLst>
-          </p:cNvPr>
-          <p:cNvSpPr>
-            <a:spLocks noGrp="1"/>
-          </p:cNvSpPr>
-          <p:nvPr>
-            <p:ph type="ctrTitle"/>
-          </p:nvPr>
-        </p:nvSpPr>
-        <p:spPr>
-          <a:xfrm>
-            <a:off x="0" y="0"/>
-            <a:ext cx="12192000" cy="6858000"/>
-          </a:xfrm>
-        </p:spPr>
-        <p:txBody>
-          <a:bodyPr anchor="ctr"/>
-          <a:lstStyle/>
-          <a:p>
-            <a:r>
-              <a:rPr lang="ru-RU" dirty="0"/>
-              <a:t>Все от Него и все к Нему идет</a:t>
-            </a:r>
-            <a:br>
-              <a:rPr lang="ru-RU" dirty="0"/>
-            </a:br>
-            <a:r>
-              <a:rPr lang="ru-RU" dirty="0"/>
-              <a:t>Душа поет небесным отголоском</a:t>
-            </a:r>
-            <a:br>
-              <a:rPr lang="ru-RU" dirty="0"/>
-            </a:br>
-            <a:r>
-              <a:rPr lang="ru-RU" dirty="0"/>
-              <a:t>Придет в мой дом – я ноги обниму Того</a:t>
-            </a:r>
-            <a:br>
-              <a:rPr lang="ru-RU" dirty="0"/>
-            </a:br>
-            <a:r>
-              <a:rPr lang="ru-RU" dirty="0"/>
-              <a:t>Кто умер на кресте Голгофском</a:t>
-            </a:r>
-            <a:endParaRPr lang="en-US" dirty="0"/>
-          </a:p>
-        </p:txBody>
-      </p:sp>
-    </p:spTree>
-    <p:extLst>
-      <p:ext uri="{BB962C8B-B14F-4D97-AF65-F5344CB8AC3E}">
-        <p14:creationId xmlns:p14="http://schemas.microsoft.com/office/powerpoint/2010/main" val="3084808657"/>
-      </p:ext>
-    </p:extLst>
-  </p:cSld>
-  <p:clrMapOvr>
-    <a:masterClrMapping/>
-  </p:clrMapOvr>
-</p:sld>
-</file>
-
-<file path=ppt/slides/slide6.xml><?xml version="1.0" encoding="utf-8"?>
-<p:sld xmlns:a="http://schemas.openxmlformats.org/drawingml/2006/main" xmlns:r="http://schemas.openxmlformats.org/officeDocument/2006/relationships" xmlns:p="http://schemas.openxmlformats.org/presentationml/2006/main">
-  <p:cSld>
-    <p:spTree>
-      <p:nvGrpSpPr>
-        <p:cNvPr id="1" name=""/>
-        <p:cNvGrpSpPr/>
-        <p:nvPr/>
-      </p:nvGrpSpPr>
-      <p:grpSpPr>
-        <a:xfrm>
-          <a:off x="0" y="0"/>
-          <a:ext cx="0" cy="0"/>
-          <a:chOff x="0" y="0"/>
-          <a:chExt cx="0" cy="0"/>
-        </a:xfrm>
-      </p:grpSpPr>
-      <p:sp>
-        <p:nvSpPr>
-          <p:cNvPr id="2" name="Title 1">
-            <a:extLst>
-              <a:ext uri="{FF2B5EF4-FFF2-40B4-BE49-F238E27FC236}">
-                <a16:creationId xmlns:a16="http://schemas.microsoft.com/office/drawing/2014/main" id="{BFDA464E-37E7-7D61-6E99-ACD35979E289}"/>
-              </a:ext>
-            </a:extLst>
-          </p:cNvPr>
-          <p:cNvSpPr>
-            <a:spLocks noGrp="1"/>
-          </p:cNvSpPr>
-          <p:nvPr>
-            <p:ph type="ctrTitle"/>
-          </p:nvPr>
-        </p:nvSpPr>
-        <p:spPr>
-          <a:xfrm>
-            <a:off x="0" y="0"/>
-            <a:ext cx="12192000" cy="6858000"/>
-          </a:xfrm>
-        </p:spPr>
-        <p:txBody>
-          <a:bodyPr anchor="ctr"/>
-          <a:lstStyle/>
-          <a:p>
-            <a:r>
-              <a:rPr lang="ru-RU" dirty="0"/>
-              <a:t>Вот почему мне хочется любить</a:t>
-            </a:r>
-            <a:br>
-              <a:rPr lang="ru-RU" dirty="0"/>
-            </a:br>
-            <a:r>
-              <a:rPr lang="ru-RU" dirty="0"/>
-              <a:t>Его сильней, и искренней, и чище</a:t>
-            </a:r>
-            <a:br>
-              <a:rPr lang="ru-RU" dirty="0"/>
-            </a:br>
-            <a:r>
-              <a:rPr lang="ru-RU" dirty="0"/>
-              <a:t>Мне есть за что Христа благодарить</a:t>
-            </a:r>
-            <a:br>
-              <a:rPr lang="ru-RU" dirty="0"/>
-            </a:br>
-            <a:r>
-              <a:rPr lang="ru-RU" dirty="0"/>
-              <a:t>Он мне купил </a:t>
-            </a:r>
-            <a:r>
-              <a:rPr lang="ru-RU"/>
-              <a:t>небесное жилище</a:t>
-            </a:r>
-            <a:br>
-              <a:rPr lang="ru-RU"/>
-            </a:br>
-            <a:r>
-              <a:rPr lang="ru-RU"/>
-              <a:t>****</a:t>
-            </a:r>
-            <a:endParaRPr lang="en-US" dirty="0"/>
-          </a:p>
-        </p:txBody>
-      </p:sp>
-    </p:spTree>
-    <p:extLst>
-      <p:ext uri="{BB962C8B-B14F-4D97-AF65-F5344CB8AC3E}">
-        <p14:creationId xmlns:p14="http://schemas.microsoft.com/office/powerpoint/2010/main" val="9391457"/>
+        <p14:creationId xmlns:p14="http://schemas.microsoft.com/office/powerpoint/2010/main" val="1666178883"/>
       </p:ext>
     </p:extLst>
   </p:cSld>
@@ -3590,7 +3407,7 @@
 </file>
 
 <file path=ppt/theme/theme1.xml><?xml version="1.0" encoding="utf-8"?>
-<a:theme xmlns:a="http://schemas.openxmlformats.org/drawingml/2006/main" name="Office Theme">
+<a:theme xmlns:a="http://schemas.openxmlformats.org/drawingml/2006/main" name="Black (Songs)">
   <a:themeElements>
     <a:clrScheme name="Office Theme">
       <a:dk1>
@@ -3600,39 +3417,39 @@
         <a:sysClr val="window" lastClr="FFFFFF"/>
       </a:lt1>
       <a:dk2>
-        <a:srgbClr val="0E2841"/>
+        <a:srgbClr val="44546A"/>
       </a:dk2>
       <a:lt2>
-        <a:srgbClr val="E8E8E8"/>
+        <a:srgbClr val="E7E6E6"/>
       </a:lt2>
       <a:accent1>
-        <a:srgbClr val="156082"/>
+        <a:srgbClr val="4472C4"/>
       </a:accent1>
       <a:accent2>
-        <a:srgbClr val="E97132"/>
+        <a:srgbClr val="ED7D31"/>
       </a:accent2>
       <a:accent3>
-        <a:srgbClr val="196B24"/>
+        <a:srgbClr val="A5A5A5"/>
       </a:accent3>
       <a:accent4>
-        <a:srgbClr val="0F9ED5"/>
+        <a:srgbClr val="FFC000"/>
       </a:accent4>
       <a:accent5>
-        <a:srgbClr val="A02B93"/>
+        <a:srgbClr val="5B9BD5"/>
       </a:accent5>
       <a:accent6>
-        <a:srgbClr val="4EA72E"/>
+        <a:srgbClr val="70AD47"/>
       </a:accent6>
       <a:hlink>
-        <a:srgbClr val="538D9D"/>
+        <a:srgbClr val="0563C1"/>
       </a:hlink>
       <a:folHlink>
-        <a:srgbClr val="A5738E"/>
+        <a:srgbClr val="954F72"/>
       </a:folHlink>
     </a:clrScheme>
     <a:fontScheme name="Office Theme">
       <a:majorFont>
-        <a:latin typeface="Aptos Display" panose="02110004020202020204"/>
+        <a:latin typeface="Calibri Light" panose="020F0302020204030204"/>
         <a:ea typeface=""/>
         <a:cs typeface=""/>
         <a:font script="Jpan" typeface="游ゴシック Light"/>
@@ -3665,26 +3482,9 @@
         <a:font script="Viet" typeface="Times New Roman"/>
         <a:font script="Uigh" typeface="Microsoft Uighur"/>
         <a:font script="Geor" typeface="Sylfaen"/>
-        <a:font script="Armn" typeface="Arial"/>
-        <a:font script="Bugi" typeface="Leelawadee UI"/>
-        <a:font script="Bopo" typeface="Microsoft JhengHei"/>
-        <a:font script="Java" typeface="Javanese Text"/>
-        <a:font script="Lisu" typeface="Segoe UI"/>
-        <a:font script="Mymr" typeface="Myanmar Text"/>
-        <a:font script="Nkoo" typeface="Ebrima"/>
-        <a:font script="Olck" typeface="Nirmala UI"/>
-        <a:font script="Osma" typeface="Ebrima"/>
-        <a:font script="Phag" typeface="Phagspa"/>
-        <a:font script="Syrn" typeface="Estrangelo Edessa"/>
-        <a:font script="Syrj" typeface="Estrangelo Edessa"/>
-        <a:font script="Syre" typeface="Estrangelo Edessa"/>
-        <a:font script="Sora" typeface="Nirmala UI"/>
-        <a:font script="Tale" typeface="Microsoft Tai Le"/>
-        <a:font script="Talu" typeface="Microsoft New Tai Lue"/>
-        <a:font script="Tfng" typeface="Ebrima"/>
       </a:majorFont>
       <a:minorFont>
-        <a:latin typeface="Aptos" panose="02110004020202020204"/>
+        <a:latin typeface="Calibri" panose="020F0502020204030204"/>
         <a:ea typeface=""/>
         <a:cs typeface=""/>
         <a:font script="Jpan" typeface="游ゴシック"/>
@@ -3717,23 +3517,6 @@
         <a:font script="Viet" typeface="Arial"/>
         <a:font script="Uigh" typeface="Microsoft Uighur"/>
         <a:font script="Geor" typeface="Sylfaen"/>
-        <a:font script="Armn" typeface="Arial"/>
-        <a:font script="Bugi" typeface="Leelawadee UI"/>
-        <a:font script="Bopo" typeface="Microsoft JhengHei"/>
-        <a:font script="Java" typeface="Javanese Text"/>
-        <a:font script="Lisu" typeface="Segoe UI"/>
-        <a:font script="Mymr" typeface="Myanmar Text"/>
-        <a:font script="Nkoo" typeface="Ebrima"/>
-        <a:font script="Olck" typeface="Nirmala UI"/>
-        <a:font script="Osma" typeface="Ebrima"/>
-        <a:font script="Phag" typeface="Phagspa"/>
-        <a:font script="Syrn" typeface="Estrangelo Edessa"/>
-        <a:font script="Syrj" typeface="Estrangelo Edessa"/>
-        <a:font script="Syre" typeface="Estrangelo Edessa"/>
-        <a:font script="Sora" typeface="Nirmala UI"/>
-        <a:font script="Tale" typeface="Microsoft Tai Le"/>
-        <a:font script="Talu" typeface="Microsoft New Tai Lue"/>
-        <a:font script="Tfng" typeface="Ebrima"/>
       </a:minorFont>
     </a:fontScheme>
     <a:fmtScheme name="Office Theme">
@@ -3795,6 +3578,13 @@
         </a:gradFill>
       </a:fillStyleLst>
       <a:lnStyleLst>
+        <a:ln w="6350" cap="flat" cmpd="sng" algn="ctr">
+          <a:solidFill>
+            <a:schemeClr val="phClr"/>
+          </a:solidFill>
+          <a:prstDash val="solid"/>
+          <a:miter lim="800000"/>
+        </a:ln>
         <a:ln w="12700" cap="flat" cmpd="sng" algn="ctr">
           <a:solidFill>
             <a:schemeClr val="phClr"/>
@@ -3803,13 +3593,6 @@
           <a:miter lim="800000"/>
         </a:ln>
         <a:ln w="19050" cap="flat" cmpd="sng" algn="ctr">
-          <a:solidFill>
-            <a:schemeClr val="phClr"/>
-          </a:solidFill>
-          <a:prstDash val="solid"/>
-          <a:miter lim="800000"/>
-        </a:ln>
-        <a:ln w="25400" cap="flat" cmpd="sng" algn="ctr">
           <a:solidFill>
             <a:schemeClr val="phClr"/>
           </a:solidFill>
@@ -3874,37 +3657,37 @@
       </a:bgFillStyleLst>
     </a:fmtScheme>
   </a:themeElements>
-  <a:objectDefaults>
-    <a:lnDef>
-      <a:spPr/>
-      <a:bodyPr/>
-      <a:lstStyle/>
-      <a:style>
-        <a:lnRef idx="2">
-          <a:schemeClr val="accent1"/>
-        </a:lnRef>
-        <a:fillRef idx="0">
-          <a:schemeClr val="accent1"/>
-        </a:fillRef>
-        <a:effectRef idx="1">
-          <a:schemeClr val="accent1"/>
-        </a:effectRef>
-        <a:fontRef idx="minor">
-          <a:schemeClr val="tx1"/>
-        </a:fontRef>
-      </a:style>
-    </a:lnDef>
-  </a:objectDefaults>
+  <a:objectDefaults/>
   <a:extraClrSchemeLst/>
   <a:extLst>
     <a:ext uri="{05A4C25C-085E-4340-85A3-A5531E510DB2}">
-      <thm15:themeFamily xmlns:thm15="http://schemas.microsoft.com/office/thememl/2012/main" name="Office Theme" id="{2E142A2C-CD16-42D6-873A-C26D2A0506FA}" vid="{3A418E6B-C5F0-4B95-8D77-61E3EF3B5DF5}"/>
+      <thm15:themeFamily xmlns:thm15="http://schemas.microsoft.com/office/thememl/2012/main" name="Black (Songs)" id="{3E87F92E-BED9-40B0-BBC7-8EF4CEE3AC8F}" vid="{D85FB571-3308-477D-8254-63ED22C5F31C}"/>
     </a:ext>
   </a:extLst>
 </a:theme>
 </file>
 
 <file path=customXml/item1.xml><?xml version="1.0" encoding="utf-8"?>
+<p:properties xmlns:p="http://schemas.microsoft.com/office/2006/metadata/properties" xmlns:xsi="http://www.w3.org/2001/XMLSchema-instance" xmlns:pc="http://schemas.microsoft.com/office/infopath/2007/PartnerControls">
+  <documentManagement>
+    <lcf76f155ced4ddcb4097134ff3c332f xmlns="243caec2-9363-411a-869a-ae66e37ba368">
+      <Terms xmlns="http://schemas.microsoft.com/office/infopath/2007/PartnerControls"/>
+    </lcf76f155ced4ddcb4097134ff3c332f>
+    <TaxCatchAll xmlns="91cc1edd-99ef-4741-81f4-b80eafe2ebea" xsi:nil="true"/>
+  </documentManagement>
+</p:properties>
+</file>
+
+<file path=customXml/item2.xml><?xml version="1.0" encoding="utf-8"?>
+<?mso-contentType ?>
+<FormTemplates xmlns="http://schemas.microsoft.com/sharepoint/v3/contenttype/forms">
+  <Display>DocumentLibraryForm</Display>
+  <Edit>DocumentLibraryForm</Edit>
+  <New>DocumentLibraryForm</New>
+</FormTemplates>
+</file>
+
+<file path=customXml/item3.xml><?xml version="1.0" encoding="utf-8"?>
 <ct:contentTypeSchema xmlns:ct="http://schemas.microsoft.com/office/2006/metadata/contentType" xmlns:ma="http://schemas.microsoft.com/office/2006/metadata/properties/metaAttributes" ct:_="" ma:_="" ma:contentTypeName="Document" ma:contentTypeID="0x010100FF98BBFE1FD9F848B9788794183D28CA" ma:contentTypeVersion="12" ma:contentTypeDescription="Create a new document." ma:contentTypeScope="" ma:versionID="04676cb7d259ef94b0a85868097fefb1">
   <xsd:schema xmlns:xsd="http://www.w3.org/2001/XMLSchema" xmlns:xs="http://www.w3.org/2001/XMLSchema" xmlns:p="http://schemas.microsoft.com/office/2006/metadata/properties" xmlns:ns2="243caec2-9363-411a-869a-ae66e37ba368" xmlns:ns3="91cc1edd-99ef-4741-81f4-b80eafe2ebea" targetNamespace="http://schemas.microsoft.com/office/2006/metadata/properties" ma:root="true" ma:fieldsID="a5cb952bc36c82b84636f1d4d03cfe1e" ns2:_="" ns3:_="">
     <xsd:import namespace="243caec2-9363-411a-869a-ae66e37ba368"/>
@@ -4105,34 +3888,40 @@
 </ct:contentTypeSchema>
 </file>
 
-<file path=customXml/item2.xml><?xml version="1.0" encoding="utf-8"?>
-<?mso-contentType ?>
-<FormTemplates xmlns="http://schemas.microsoft.com/sharepoint/v3/contenttype/forms">
-  <Display>DocumentLibraryForm</Display>
-  <Edit>DocumentLibraryForm</Edit>
-  <New>DocumentLibraryForm</New>
-</FormTemplates>
-</file>
-
-<file path=customXml/item3.xml><?xml version="1.0" encoding="utf-8"?>
-<p:properties xmlns:p="http://schemas.microsoft.com/office/2006/metadata/properties" xmlns:xsi="http://www.w3.org/2001/XMLSchema-instance" xmlns:pc="http://schemas.microsoft.com/office/infopath/2007/PartnerControls">
-  <documentManagement>
-    <lcf76f155ced4ddcb4097134ff3c332f xmlns="243caec2-9363-411a-869a-ae66e37ba368">
-      <Terms xmlns="http://schemas.microsoft.com/office/infopath/2007/PartnerControls"/>
-    </lcf76f155ced4ddcb4097134ff3c332f>
-    <TaxCatchAll xmlns="91cc1edd-99ef-4741-81f4-b80eafe2ebea" xsi:nil="true"/>
-  </documentManagement>
-</p:properties>
-</file>
-
 <file path=customXml/itemProps1.xml><?xml version="1.0" encoding="utf-8"?>
-<ds:datastoreItem xmlns:ds="http://schemas.openxmlformats.org/officeDocument/2006/customXml" ds:itemID="{BC0C9DC6-6E86-4609-9710-11B7A18B24E0}"/>
+<ds:datastoreItem xmlns:ds="http://schemas.openxmlformats.org/officeDocument/2006/customXml" ds:itemID="{975823BA-DE42-45EE-A2BD-2B3C21CC6510}">
+  <ds:schemaRefs>
+    <ds:schemaRef ds:uri="http://schemas.microsoft.com/office/2006/metadata/properties"/>
+    <ds:schemaRef ds:uri="http://schemas.microsoft.com/office/infopath/2007/PartnerControls"/>
+    <ds:schemaRef ds:uri="243caec2-9363-411a-869a-ae66e37ba368"/>
+    <ds:schemaRef ds:uri="91cc1edd-99ef-4741-81f4-b80eafe2ebea"/>
+  </ds:schemaRefs>
+</ds:datastoreItem>
 </file>
 
 <file path=customXml/itemProps2.xml><?xml version="1.0" encoding="utf-8"?>
-<ds:datastoreItem xmlns:ds="http://schemas.openxmlformats.org/officeDocument/2006/customXml" ds:itemID="{58960387-ACDC-4C9B-BD8C-3B3E4AB7D362}"/>
+<ds:datastoreItem xmlns:ds="http://schemas.openxmlformats.org/officeDocument/2006/customXml" ds:itemID="{FCEB8631-8890-4318-A2E8-CD0D3034A253}">
+  <ds:schemaRefs>
+    <ds:schemaRef ds:uri="http://schemas.microsoft.com/sharepoint/v3/contenttype/forms"/>
+  </ds:schemaRefs>
+</ds:datastoreItem>
 </file>
 
 <file path=customXml/itemProps3.xml><?xml version="1.0" encoding="utf-8"?>
-<ds:datastoreItem xmlns:ds="http://schemas.openxmlformats.org/officeDocument/2006/customXml" ds:itemID="{5B2702A9-D436-40BD-9F3B-5B13F1D8332D}"/>
+<ds:datastoreItem xmlns:ds="http://schemas.openxmlformats.org/officeDocument/2006/customXml" ds:itemID="{6D87981A-65A6-48CC-B5AE-69B24FE3A632}">
+  <ds:schemaRefs>
+    <ds:schemaRef ds:uri="http://schemas.microsoft.com/office/2006/metadata/contentType"/>
+    <ds:schemaRef ds:uri="http://schemas.microsoft.com/office/2006/metadata/properties/metaAttributes"/>
+    <ds:schemaRef ds:uri="http://www.w3.org/2001/XMLSchema"/>
+    <ds:schemaRef ds:uri="http://schemas.microsoft.com/office/2006/metadata/properties"/>
+    <ds:schemaRef ds:uri="243caec2-9363-411a-869a-ae66e37ba368"/>
+    <ds:schemaRef ds:uri="91cc1edd-99ef-4741-81f4-b80eafe2ebea"/>
+    <ds:schemaRef ds:uri="http://schemas.microsoft.com/office/2006/documentManagement/types"/>
+    <ds:schemaRef ds:uri="http://schemas.microsoft.com/office/infopath/2007/PartnerControls"/>
+    <ds:schemaRef ds:uri="http://schemas.openxmlformats.org/package/2006/metadata/core-properties"/>
+    <ds:schemaRef ds:uri="http://purl.org/dc/elements/1.1/"/>
+    <ds:schemaRef ds:uri="http://purl.org/dc/terms/"/>
+    <ds:schemaRef ds:uri="http://schemas.microsoft.com/internal/obd"/>
+  </ds:schemaRefs>
+</ds:datastoreItem>
 </file>
</xml_diff>